<commit_message>
data dictionary of pc table changed
</commit_message>
<xml_diff>
--- a/ProjectDetails/Presentation.pptx
+++ b/ProjectDetails/Presentation.pptx
@@ -38,74 +38,74 @@
   <p:defaultTextStyle>
     <a:lvl1pPr algn="ctr" defTabSz="584200">
       <a:defRPr sz="3600">
-        <a:latin typeface="Helvetica Light"/>
-        <a:ea typeface="Helvetica Light"/>
-        <a:cs typeface="Helvetica Light"/>
-        <a:sym typeface="Helvetica Light"/>
+        <a:latin typeface="+mj-lt"/>
+        <a:ea typeface="+mj-ea"/>
+        <a:cs typeface="+mj-cs"/>
+        <a:sym typeface="Helvetica"/>
       </a:defRPr>
     </a:lvl1pPr>
     <a:lvl2pPr algn="ctr" defTabSz="584200">
       <a:defRPr sz="3600">
-        <a:latin typeface="Helvetica Light"/>
-        <a:ea typeface="Helvetica Light"/>
-        <a:cs typeface="Helvetica Light"/>
-        <a:sym typeface="Helvetica Light"/>
+        <a:latin typeface="+mj-lt"/>
+        <a:ea typeface="+mj-ea"/>
+        <a:cs typeface="+mj-cs"/>
+        <a:sym typeface="Helvetica"/>
       </a:defRPr>
     </a:lvl2pPr>
     <a:lvl3pPr algn="ctr" defTabSz="584200">
       <a:defRPr sz="3600">
-        <a:latin typeface="Helvetica Light"/>
-        <a:ea typeface="Helvetica Light"/>
-        <a:cs typeface="Helvetica Light"/>
-        <a:sym typeface="Helvetica Light"/>
+        <a:latin typeface="+mj-lt"/>
+        <a:ea typeface="+mj-ea"/>
+        <a:cs typeface="+mj-cs"/>
+        <a:sym typeface="Helvetica"/>
       </a:defRPr>
     </a:lvl3pPr>
     <a:lvl4pPr algn="ctr" defTabSz="584200">
       <a:defRPr sz="3600">
-        <a:latin typeface="Helvetica Light"/>
-        <a:ea typeface="Helvetica Light"/>
-        <a:cs typeface="Helvetica Light"/>
-        <a:sym typeface="Helvetica Light"/>
+        <a:latin typeface="+mj-lt"/>
+        <a:ea typeface="+mj-ea"/>
+        <a:cs typeface="+mj-cs"/>
+        <a:sym typeface="Helvetica"/>
       </a:defRPr>
     </a:lvl4pPr>
     <a:lvl5pPr algn="ctr" defTabSz="584200">
       <a:defRPr sz="3600">
-        <a:latin typeface="Helvetica Light"/>
-        <a:ea typeface="Helvetica Light"/>
-        <a:cs typeface="Helvetica Light"/>
-        <a:sym typeface="Helvetica Light"/>
+        <a:latin typeface="+mj-lt"/>
+        <a:ea typeface="+mj-ea"/>
+        <a:cs typeface="+mj-cs"/>
+        <a:sym typeface="Helvetica"/>
       </a:defRPr>
     </a:lvl5pPr>
     <a:lvl6pPr algn="ctr" defTabSz="584200">
       <a:defRPr sz="3600">
-        <a:latin typeface="Helvetica Light"/>
-        <a:ea typeface="Helvetica Light"/>
-        <a:cs typeface="Helvetica Light"/>
-        <a:sym typeface="Helvetica Light"/>
+        <a:latin typeface="+mj-lt"/>
+        <a:ea typeface="+mj-ea"/>
+        <a:cs typeface="+mj-cs"/>
+        <a:sym typeface="Helvetica"/>
       </a:defRPr>
     </a:lvl6pPr>
     <a:lvl7pPr algn="ctr" defTabSz="584200">
       <a:defRPr sz="3600">
-        <a:latin typeface="Helvetica Light"/>
-        <a:ea typeface="Helvetica Light"/>
-        <a:cs typeface="Helvetica Light"/>
-        <a:sym typeface="Helvetica Light"/>
+        <a:latin typeface="+mj-lt"/>
+        <a:ea typeface="+mj-ea"/>
+        <a:cs typeface="+mj-cs"/>
+        <a:sym typeface="Helvetica"/>
       </a:defRPr>
     </a:lvl7pPr>
     <a:lvl8pPr algn="ctr" defTabSz="584200">
       <a:defRPr sz="3600">
-        <a:latin typeface="Helvetica Light"/>
-        <a:ea typeface="Helvetica Light"/>
-        <a:cs typeface="Helvetica Light"/>
-        <a:sym typeface="Helvetica Light"/>
+        <a:latin typeface="+mj-lt"/>
+        <a:ea typeface="+mj-ea"/>
+        <a:cs typeface="+mj-cs"/>
+        <a:sym typeface="Helvetica"/>
       </a:defRPr>
     </a:lvl8pPr>
     <a:lvl9pPr algn="ctr" defTabSz="584200">
       <a:defRPr sz="3600">
-        <a:latin typeface="Helvetica Light"/>
-        <a:ea typeface="Helvetica Light"/>
-        <a:cs typeface="Helvetica Light"/>
-        <a:sym typeface="Helvetica Light"/>
+        <a:latin typeface="+mj-lt"/>
+        <a:ea typeface="+mj-ea"/>
+        <a:cs typeface="+mj-cs"/>
+        <a:sym typeface="Helvetica"/>
       </a:defRPr>
     </a:lvl9pPr>
   </p:defaultTextStyle>
@@ -349,7 +349,7 @@
         <p:spPr>
           <a:xfrm>
             <a:off x="1270000" y="5029200"/>
-            <a:ext cx="10464800" cy="3568700"/>
+            <a:ext cx="10464800" cy="4724400"/>
           </a:xfrm>
           <a:prstGeom prst="rect">
             <a:avLst/>
@@ -564,8 +564,8 @@
         </p:nvSpPr>
         <p:spPr>
           <a:xfrm>
-            <a:off x="1270000" y="4279900"/>
-            <a:ext cx="10464800" cy="3860800"/>
+            <a:off x="1270000" y="0"/>
+            <a:ext cx="10464800" cy="8140700"/>
           </a:xfrm>
           <a:prstGeom prst="rect">
             <a:avLst/>
@@ -963,8 +963,8 @@
         </p:nvSpPr>
         <p:spPr>
           <a:xfrm>
-            <a:off x="952500" y="93506"/>
-            <a:ext cx="11099800" cy="2860988"/>
+            <a:off x="952500" y="3425"/>
+            <a:ext cx="11099800" cy="3041150"/>
           </a:xfrm>
           <a:prstGeom prst="rect">
             <a:avLst/>
@@ -1758,7 +1758,7 @@
           <a:latin typeface="+mn-lt"/>
           <a:ea typeface="+mn-ea"/>
           <a:cs typeface="+mn-cs"/>
-          <a:sym typeface="Helvetica Light"/>
+          <a:sym typeface="Helvetica"/>
         </a:defRPr>
       </a:lvl1pPr>
       <a:lvl2pPr algn="r" defTabSz="584200">
@@ -1769,7 +1769,7 @@
           <a:latin typeface="+mn-lt"/>
           <a:ea typeface="+mn-ea"/>
           <a:cs typeface="+mn-cs"/>
-          <a:sym typeface="Helvetica Light"/>
+          <a:sym typeface="Helvetica"/>
         </a:defRPr>
       </a:lvl2pPr>
       <a:lvl3pPr algn="r" defTabSz="584200">
@@ -1780,7 +1780,7 @@
           <a:latin typeface="+mn-lt"/>
           <a:ea typeface="+mn-ea"/>
           <a:cs typeface="+mn-cs"/>
-          <a:sym typeface="Helvetica Light"/>
+          <a:sym typeface="Helvetica"/>
         </a:defRPr>
       </a:lvl3pPr>
       <a:lvl4pPr algn="r" defTabSz="584200">
@@ -1791,7 +1791,7 @@
           <a:latin typeface="+mn-lt"/>
           <a:ea typeface="+mn-ea"/>
           <a:cs typeface="+mn-cs"/>
-          <a:sym typeface="Helvetica Light"/>
+          <a:sym typeface="Helvetica"/>
         </a:defRPr>
       </a:lvl4pPr>
       <a:lvl5pPr algn="r" defTabSz="584200">
@@ -1802,7 +1802,7 @@
           <a:latin typeface="+mn-lt"/>
           <a:ea typeface="+mn-ea"/>
           <a:cs typeface="+mn-cs"/>
-          <a:sym typeface="Helvetica Light"/>
+          <a:sym typeface="Helvetica"/>
         </a:defRPr>
       </a:lvl5pPr>
       <a:lvl6pPr algn="r" defTabSz="584200">
@@ -1813,7 +1813,7 @@
           <a:latin typeface="+mn-lt"/>
           <a:ea typeface="+mn-ea"/>
           <a:cs typeface="+mn-cs"/>
-          <a:sym typeface="Helvetica Light"/>
+          <a:sym typeface="Helvetica"/>
         </a:defRPr>
       </a:lvl6pPr>
       <a:lvl7pPr algn="r" defTabSz="584200">
@@ -1824,7 +1824,7 @@
           <a:latin typeface="+mn-lt"/>
           <a:ea typeface="+mn-ea"/>
           <a:cs typeface="+mn-cs"/>
-          <a:sym typeface="Helvetica Light"/>
+          <a:sym typeface="Helvetica"/>
         </a:defRPr>
       </a:lvl7pPr>
       <a:lvl8pPr algn="r" defTabSz="584200">
@@ -1835,7 +1835,7 @@
           <a:latin typeface="+mn-lt"/>
           <a:ea typeface="+mn-ea"/>
           <a:cs typeface="+mn-cs"/>
-          <a:sym typeface="Helvetica Light"/>
+          <a:sym typeface="Helvetica"/>
         </a:defRPr>
       </a:lvl8pPr>
       <a:lvl9pPr algn="r" defTabSz="584200">
@@ -1846,7 +1846,7 @@
           <a:latin typeface="+mn-lt"/>
           <a:ea typeface="+mn-ea"/>
           <a:cs typeface="+mn-cs"/>
-          <a:sym typeface="Helvetica Light"/>
+          <a:sym typeface="Helvetica"/>
         </a:defRPr>
       </a:lvl9pPr>
     </p:otherStyle>
@@ -1940,8 +1940,8 @@
         </p:nvSpPr>
         <p:spPr>
           <a:xfrm>
-            <a:off x="3791458" y="698500"/>
-            <a:ext cx="5421885" cy="1320801"/>
+            <a:off x="3842258" y="749298"/>
+            <a:ext cx="5320285" cy="1219201"/>
           </a:xfrm>
           <a:prstGeom prst="rect">
             <a:avLst/>
@@ -1961,7 +1961,12 @@
           </a:bodyPr>
           <a:lstStyle>
             <a:lvl1pPr>
-              <a:defRPr sz="8000"/>
+              <a:defRPr sz="8000">
+                <a:latin typeface="Helvetica Light"/>
+                <a:ea typeface="Helvetica Light"/>
+                <a:cs typeface="Helvetica Light"/>
+                <a:sym typeface="Helvetica Light"/>
+              </a:defRPr>
             </a:lvl1pPr>
           </a:lstStyle>
           <a:p>
@@ -1977,7 +1982,7 @@
       </p:sp>
       <p:pic>
         <p:nvPicPr>
-          <p:cNvPr id="55" name="ComponentDa.jpg"/>
+          <p:cNvPr id="55" name="image2.jpeg"/>
           <p:cNvPicPr/>
           <p:nvPr/>
         </p:nvPicPr>
@@ -1991,8 +1996,8 @@
         </p:blipFill>
         <p:spPr>
           <a:xfrm>
-            <a:off x="1536700" y="2355067"/>
-            <a:ext cx="8670715" cy="5043466"/>
+            <a:off x="1536700" y="2355064"/>
+            <a:ext cx="8670715" cy="5043472"/>
           </a:xfrm>
           <a:prstGeom prst="rect">
             <a:avLst/>
@@ -2036,8 +2041,8 @@
         </p:nvSpPr>
         <p:spPr>
           <a:xfrm>
-            <a:off x="5569965" y="698500"/>
-            <a:ext cx="1864869" cy="1320801"/>
+            <a:off x="5620765" y="749298"/>
+            <a:ext cx="1763269" cy="1219201"/>
           </a:xfrm>
           <a:prstGeom prst="rect">
             <a:avLst/>
@@ -2057,7 +2062,12 @@
           </a:bodyPr>
           <a:lstStyle>
             <a:lvl1pPr>
-              <a:defRPr sz="8000"/>
+              <a:defRPr sz="8000">
+                <a:latin typeface="Helvetica Light"/>
+                <a:ea typeface="Helvetica Light"/>
+                <a:cs typeface="Helvetica Light"/>
+                <a:sym typeface="Helvetica Light"/>
+              </a:defRPr>
             </a:lvl1pPr>
           </a:lstStyle>
           <a:p>
@@ -2073,7 +2083,7 @@
       </p:sp>
       <p:pic>
         <p:nvPicPr>
-          <p:cNvPr id="58" name="LabDA.jpg"/>
+          <p:cNvPr id="58" name="image3.jpeg"/>
           <p:cNvPicPr/>
           <p:nvPr/>
         </p:nvPicPr>
@@ -2132,8 +2142,8 @@
         </p:nvSpPr>
         <p:spPr>
           <a:xfrm>
-            <a:off x="3961130" y="698500"/>
-            <a:ext cx="5082541" cy="1320801"/>
+            <a:off x="4011929" y="749298"/>
+            <a:ext cx="4980941" cy="1219201"/>
           </a:xfrm>
           <a:prstGeom prst="rect">
             <a:avLst/>
@@ -2153,7 +2163,12 @@
           </a:bodyPr>
           <a:lstStyle>
             <a:lvl1pPr>
-              <a:defRPr sz="8000"/>
+              <a:defRPr sz="8000">
+                <a:latin typeface="Helvetica Light"/>
+                <a:ea typeface="Helvetica Light"/>
+                <a:cs typeface="Helvetica Light"/>
+                <a:sym typeface="Helvetica Light"/>
+              </a:defRPr>
             </a:lvl1pPr>
           </a:lstStyle>
           <a:p>
@@ -2169,7 +2184,7 @@
       </p:sp>
       <p:pic>
         <p:nvPicPr>
-          <p:cNvPr id="61" name="LabAdminDA.jpg"/>
+          <p:cNvPr id="61" name="image4.jpeg"/>
           <p:cNvPicPr/>
           <p:nvPr/>
         </p:nvPicPr>
@@ -2228,7 +2243,7 @@
         </p:nvSpPr>
         <p:spPr>
           <a:xfrm>
-            <a:off x="3820414" y="698500"/>
+            <a:off x="3820414" y="698497"/>
             <a:ext cx="5363973" cy="1320801"/>
           </a:xfrm>
           <a:prstGeom prst="rect">
@@ -2249,7 +2264,12 @@
           </a:bodyPr>
           <a:lstStyle>
             <a:lvl1pPr>
-              <a:defRPr sz="8000"/>
+              <a:defRPr sz="8000">
+                <a:latin typeface="Helvetica Light"/>
+                <a:ea typeface="Helvetica Light"/>
+                <a:cs typeface="Helvetica Light"/>
+                <a:sym typeface="Helvetica Light"/>
+              </a:defRPr>
             </a:lvl1pPr>
           </a:lstStyle>
           <a:p>
@@ -2265,7 +2285,7 @@
       </p:sp>
       <p:pic>
         <p:nvPicPr>
-          <p:cNvPr id="64" name="pasted-image.tif"/>
+          <p:cNvPr id="64" name="image1.tif"/>
           <p:cNvPicPr/>
           <p:nvPr/>
         </p:nvPicPr>
@@ -2280,7 +2300,7 @@
         <p:spPr>
           <a:xfrm>
             <a:off x="1060450" y="2832100"/>
-            <a:ext cx="8659099" cy="4089400"/>
+            <a:ext cx="8659101" cy="4089400"/>
           </a:xfrm>
           <a:prstGeom prst="rect">
             <a:avLst/>
@@ -2324,8 +2344,8 @@
         </p:nvSpPr>
         <p:spPr>
           <a:xfrm>
-            <a:off x="4130801" y="698500"/>
-            <a:ext cx="4743197" cy="1320801"/>
+            <a:off x="4181601" y="749298"/>
+            <a:ext cx="4641597" cy="1219201"/>
           </a:xfrm>
           <a:prstGeom prst="rect">
             <a:avLst/>
@@ -2345,7 +2365,12 @@
           </a:bodyPr>
           <a:lstStyle>
             <a:lvl1pPr>
-              <a:defRPr sz="8000"/>
+              <a:defRPr sz="8000">
+                <a:latin typeface="Helvetica Light"/>
+                <a:ea typeface="Helvetica Light"/>
+                <a:cs typeface="Helvetica Light"/>
+                <a:sym typeface="Helvetica Light"/>
+              </a:defRPr>
             </a:lvl1pPr>
           </a:lstStyle>
           <a:p>
@@ -2361,7 +2386,7 @@
       </p:sp>
       <p:pic>
         <p:nvPicPr>
-          <p:cNvPr id="67" name="ComplaintDA.jpg"/>
+          <p:cNvPr id="67" name="image5.jpeg"/>
           <p:cNvPicPr/>
           <p:nvPr/>
         </p:nvPicPr>
@@ -2375,8 +2400,8 @@
         </p:blipFill>
         <p:spPr>
           <a:xfrm>
-            <a:off x="825500" y="2253317"/>
-            <a:ext cx="9041380" cy="5246966"/>
+            <a:off x="825500" y="2253314"/>
+            <a:ext cx="9041380" cy="5246972"/>
           </a:xfrm>
           <a:prstGeom prst="rect">
             <a:avLst/>
@@ -2420,8 +2445,8 @@
         </p:nvSpPr>
         <p:spPr>
           <a:xfrm>
-            <a:off x="3819905" y="698500"/>
-            <a:ext cx="5364989" cy="1320801"/>
+            <a:off x="3870703" y="749298"/>
+            <a:ext cx="5263389" cy="1219201"/>
           </a:xfrm>
           <a:prstGeom prst="rect">
             <a:avLst/>
@@ -2441,7 +2466,12 @@
           </a:bodyPr>
           <a:lstStyle>
             <a:lvl1pPr>
-              <a:defRPr sz="8000"/>
+              <a:defRPr sz="8000">
+                <a:latin typeface="Helvetica Light"/>
+                <a:ea typeface="Helvetica Light"/>
+                <a:cs typeface="Helvetica Light"/>
+                <a:sym typeface="Helvetica Light"/>
+              </a:defRPr>
             </a:lvl1pPr>
           </a:lstStyle>
           <a:p>
@@ -2457,7 +2487,7 @@
       </p:sp>
       <p:pic>
         <p:nvPicPr>
-          <p:cNvPr id="70" name="DataModel.jpg"/>
+          <p:cNvPr id="70" name="image6.jpeg"/>
           <p:cNvPicPr/>
           <p:nvPr/>
         </p:nvPicPr>
@@ -2472,7 +2502,7 @@
         <p:spPr>
           <a:xfrm>
             <a:off x="-1727288" y="2012950"/>
-            <a:ext cx="14909976" cy="6428334"/>
+            <a:ext cx="14909977" cy="6428334"/>
           </a:xfrm>
           <a:prstGeom prst="rect">
             <a:avLst/>
@@ -2516,8 +2546,8 @@
         </p:nvSpPr>
         <p:spPr>
           <a:xfrm>
-            <a:off x="4243578" y="698500"/>
-            <a:ext cx="4517645" cy="1320801"/>
+            <a:off x="4294378" y="749298"/>
+            <a:ext cx="4416045" cy="1219201"/>
           </a:xfrm>
           <a:prstGeom prst="rect">
             <a:avLst/>
@@ -2537,7 +2567,12 @@
           </a:bodyPr>
           <a:lstStyle>
             <a:lvl1pPr>
-              <a:defRPr sz="8000"/>
+              <a:defRPr sz="8000">
+                <a:latin typeface="Helvetica Light"/>
+                <a:ea typeface="Helvetica Light"/>
+                <a:cs typeface="Helvetica Light"/>
+                <a:sym typeface="Helvetica Light"/>
+              </a:defRPr>
             </a:lvl1pPr>
           </a:lstStyle>
           <a:p>
@@ -2553,7 +2588,7 @@
       </p:sp>
       <p:pic>
         <p:nvPicPr>
-          <p:cNvPr id="73" name="ERFinal.jpg"/>
+          <p:cNvPr id="73" name="image7.jpeg"/>
           <p:cNvPicPr/>
           <p:nvPr/>
         </p:nvPicPr>
@@ -2568,7 +2603,7 @@
         <p:spPr>
           <a:xfrm>
             <a:off x="-1038722" y="2231008"/>
-            <a:ext cx="14288146" cy="6891784"/>
+            <a:ext cx="14288147" cy="6891784"/>
           </a:xfrm>
           <a:prstGeom prst="rect">
             <a:avLst/>
@@ -2671,8 +2706,8 @@
         </p:nvSpPr>
         <p:spPr>
           <a:xfrm>
-            <a:off x="396356" y="119247"/>
-            <a:ext cx="12212088" cy="9373627"/>
+            <a:off x="396356" y="119246"/>
+            <a:ext cx="12212088" cy="9373629"/>
           </a:xfrm>
           <a:prstGeom prst="rect">
             <a:avLst/>
@@ -2755,6 +2790,7 @@
                           <a:latin typeface="Helvetica Light"/>
                           <a:ea typeface="Helvetica Light"/>
                           <a:cs typeface="Helvetica Light"/>
+                          <a:sym typeface="Helvetica Light"/>
                         </a:rPr>
                         <a:t>Name</a:t>
                       </a:r>
@@ -2808,6 +2844,7 @@
                           <a:latin typeface="Helvetica Light"/>
                           <a:ea typeface="Helvetica Light"/>
                           <a:cs typeface="Helvetica Light"/>
+                          <a:sym typeface="Helvetica Light"/>
                         </a:rPr>
                         <a:t>Data Type</a:t>
                       </a:r>
@@ -2861,6 +2898,7 @@
                           <a:latin typeface="Helvetica Light"/>
                           <a:ea typeface="Helvetica Light"/>
                           <a:cs typeface="Helvetica Light"/>
+                          <a:sym typeface="Helvetica Light"/>
                         </a:rPr>
                         <a:t>Constraints</a:t>
                       </a:r>
@@ -2914,6 +2952,7 @@
                           <a:latin typeface="Helvetica Light"/>
                           <a:ea typeface="Helvetica Light"/>
                           <a:cs typeface="Helvetica Light"/>
+                          <a:sym typeface="Helvetica Light"/>
                         </a:rPr>
                         <a:t>Details</a:t>
                       </a:r>
@@ -2952,6 +2991,7 @@
                           <a:latin typeface="Helvetica Light"/>
                           <a:ea typeface="Helvetica Light"/>
                           <a:cs typeface="Helvetica Light"/>
+                          <a:sym typeface="Helvetica Light"/>
                         </a:rPr>
                         <a:t>Title</a:t>
                       </a:r>
@@ -2985,6 +3025,7 @@
                           <a:latin typeface="Helvetica Light"/>
                           <a:ea typeface="Helvetica Light"/>
                           <a:cs typeface="Helvetica Light"/>
+                          <a:sym typeface="Helvetica Light"/>
                         </a:rPr>
                         <a:t>varchar(200)</a:t>
                       </a:r>
@@ -3018,6 +3059,7 @@
                           <a:latin typeface="Helvetica Light"/>
                           <a:ea typeface="Helvetica Light"/>
                           <a:cs typeface="Helvetica Light"/>
+                          <a:sym typeface="Helvetica Light"/>
                         </a:rPr>
                         <a:t>NOT NULL</a:t>
                       </a:r>
@@ -3051,6 +3093,7 @@
                           <a:latin typeface="Helvetica Light"/>
                           <a:ea typeface="Helvetica Light"/>
                           <a:cs typeface="Helvetica Light"/>
+                          <a:sym typeface="Helvetica Light"/>
                         </a:rPr>
                         <a:t>Brief description of the complaint</a:t>
                       </a:r>
@@ -3086,6 +3129,7 @@
                           <a:latin typeface="Helvetica Light"/>
                           <a:ea typeface="Helvetica Light"/>
                           <a:cs typeface="Helvetica Light"/>
+                          <a:sym typeface="Helvetica Light"/>
                         </a:rPr>
                         <a:t>Complaint_ID</a:t>
                       </a:r>
@@ -3119,6 +3163,7 @@
                           <a:latin typeface="Helvetica Light"/>
                           <a:ea typeface="Helvetica Light"/>
                           <a:cs typeface="Helvetica Light"/>
+                          <a:sym typeface="Helvetica Light"/>
                         </a:rPr>
                         <a:t>INT</a:t>
                       </a:r>
@@ -3152,6 +3197,7 @@
                           <a:latin typeface="Helvetica Light"/>
                           <a:ea typeface="Helvetica Light"/>
                           <a:cs typeface="Helvetica Light"/>
+                          <a:sym typeface="Helvetica Light"/>
                         </a:rPr>
                         <a:t>NOT NULL</a:t>
                       </a:r>
@@ -3159,6 +3205,7 @@
                         <a:latin typeface="Helvetica Light"/>
                         <a:ea typeface="Helvetica Light"/>
                         <a:cs typeface="Helvetica Light"/>
+                        <a:sym typeface="Helvetica Light"/>
                       </a:endParaRPr>
                     </a:p>
                     <a:p>
@@ -3170,6 +3217,7 @@
                           <a:latin typeface="Helvetica Light"/>
                           <a:ea typeface="Helvetica Light"/>
                           <a:cs typeface="Helvetica Light"/>
+                          <a:sym typeface="Helvetica Light"/>
                         </a:rPr>
                         <a:t>UNIQUE</a:t>
                       </a:r>
@@ -3199,11 +3247,6 @@
                         <a:defRPr b="0" i="0" sz="1800"/>
                       </a:pPr>
                       <a:r>
-                        <a:rPr sz="2600">
-                          <a:latin typeface="Helvetica Light"/>
-                          <a:ea typeface="Helvetica Light"/>
-                          <a:cs typeface="Helvetica Light"/>
-                        </a:rPr>
                         <a:t/>
                       </a:r>
                     </a:p>
@@ -3238,6 +3281,7 @@
                           <a:latin typeface="Helvetica Light"/>
                           <a:ea typeface="Helvetica Light"/>
                           <a:cs typeface="Helvetica Light"/>
+                          <a:sym typeface="Helvetica Light"/>
                         </a:rPr>
                         <a:t>Date_of_complaint</a:t>
                       </a:r>
@@ -3271,6 +3315,7 @@
                           <a:latin typeface="Helvetica Light"/>
                           <a:ea typeface="Helvetica Light"/>
                           <a:cs typeface="Helvetica Light"/>
+                          <a:sym typeface="Helvetica Light"/>
                         </a:rPr>
                         <a:t>DATE</a:t>
                       </a:r>
@@ -3304,6 +3349,7 @@
                           <a:latin typeface="Helvetica Light"/>
                           <a:ea typeface="Helvetica Light"/>
                           <a:cs typeface="Helvetica Light"/>
+                          <a:sym typeface="Helvetica Light"/>
                         </a:rPr>
                         <a:t>NOT NULL</a:t>
                       </a:r>
@@ -3337,6 +3383,7 @@
                           <a:latin typeface="Helvetica Light"/>
                           <a:ea typeface="Helvetica Light"/>
                           <a:cs typeface="Helvetica Light"/>
+                          <a:sym typeface="Helvetica Light"/>
                         </a:rPr>
                         <a:t>Date when the complaint was lodged</a:t>
                       </a:r>
@@ -3372,6 +3419,7 @@
                           <a:latin typeface="Helvetica Light"/>
                           <a:ea typeface="Helvetica Light"/>
                           <a:cs typeface="Helvetica Light"/>
+                          <a:sym typeface="Helvetica Light"/>
                         </a:rPr>
                         <a:t>Status</a:t>
                       </a:r>
@@ -3405,6 +3453,7 @@
                           <a:latin typeface="Helvetica Light"/>
                           <a:ea typeface="Helvetica Light"/>
                           <a:cs typeface="Helvetica Light"/>
+                          <a:sym typeface="Helvetica Light"/>
                         </a:rPr>
                         <a:t>INT</a:t>
                       </a:r>
@@ -3438,6 +3487,7 @@
                           <a:latin typeface="Helvetica Light"/>
                           <a:ea typeface="Helvetica Light"/>
                           <a:cs typeface="Helvetica Light"/>
+                          <a:sym typeface="Helvetica Light"/>
                         </a:rPr>
                         <a:t>NOT NULL</a:t>
                       </a:r>
@@ -3471,6 +3521,7 @@
                           <a:latin typeface="Helvetica Light"/>
                           <a:ea typeface="Helvetica Light"/>
                           <a:cs typeface="Helvetica Light"/>
+                          <a:sym typeface="Helvetica Light"/>
                         </a:rPr>
                         <a:t>0-waiting for approval</a:t>
                       </a:r>
@@ -3478,6 +3529,7 @@
                         <a:latin typeface="Helvetica Light"/>
                         <a:ea typeface="Helvetica Light"/>
                         <a:cs typeface="Helvetica Light"/>
+                        <a:sym typeface="Helvetica Light"/>
                       </a:endParaRPr>
                     </a:p>
                     <a:p>
@@ -3489,6 +3541,7 @@
                           <a:latin typeface="Helvetica Light"/>
                           <a:ea typeface="Helvetica Light"/>
                           <a:cs typeface="Helvetica Light"/>
+                          <a:sym typeface="Helvetica Light"/>
                         </a:rPr>
                         <a:t>1-approved, unresolved</a:t>
                       </a:r>
@@ -3496,6 +3549,7 @@
                         <a:latin typeface="Helvetica Light"/>
                         <a:ea typeface="Helvetica Light"/>
                         <a:cs typeface="Helvetica Light"/>
+                        <a:sym typeface="Helvetica Light"/>
                       </a:endParaRPr>
                     </a:p>
                     <a:p>
@@ -3507,24 +3561,168 @@
                           <a:latin typeface="Helvetica Light"/>
                           <a:ea typeface="Helvetica Light"/>
                           <a:cs typeface="Helvetica Light"/>
+                          <a:sym typeface="Helvetica Light"/>
                         </a:rPr>
                         <a:t>2-resolved</a:t>
+                      </a:r>
+                    </a:p>
+                  </a:txBody>
+                  <a:tcPr marL="50800" marR="50800" marT="50800" marB="50800" anchor="ctr" anchorCtr="0" horzOverflow="overflow">
+                    <a:lnL w="12700">
+                      <a:miter lim="400000"/>
+                    </a:lnL>
+                    <a:lnR w="12700">
+                      <a:miter lim="400000"/>
+                    </a:lnR>
+                    <a:lnT w="12700">
+                      <a:miter lim="400000"/>
+                    </a:lnT>
+                    <a:lnB w="12700">
+                      <a:miter lim="400000"/>
+                    </a:lnB>
+                  </a:tcPr>
+                </a:tc>
+              </a:tr>
+              <a:tr h="943312">
+                <a:tc>
+                  <a:txBody>
+                    <a:bodyPr/>
+                    <a:lstStyle/>
+                    <a:p>
+                      <a:pPr lvl="0" algn="ctr" defTabSz="914400">
+                        <a:defRPr b="0" i="0" sz="1800"/>
+                      </a:pPr>
+                      <a:r>
+                        <a:rPr sz="2600">
+                          <a:latin typeface="Helvetica Light"/>
+                          <a:ea typeface="Helvetica Light"/>
+                          <a:cs typeface="Helvetica Light"/>
+                          <a:sym typeface="Helvetica Light"/>
+                        </a:rPr>
+                        <a:t>Complainer_ID</a:t>
+                      </a:r>
+                    </a:p>
+                  </a:txBody>
+                  <a:tcPr marL="50800" marR="50800" marT="50800" marB="50800" anchor="ctr" anchorCtr="0" horzOverflow="overflow">
+                    <a:lnL w="12700">
+                      <a:miter lim="400000"/>
+                    </a:lnL>
+                    <a:lnR w="12700">
+                      <a:miter lim="400000"/>
+                    </a:lnR>
+                    <a:lnT w="12700">
+                      <a:miter lim="400000"/>
+                    </a:lnT>
+                    <a:lnB w="12700">
+                      <a:miter lim="400000"/>
+                    </a:lnB>
+                  </a:tcPr>
+                </a:tc>
+                <a:tc>
+                  <a:txBody>
+                    <a:bodyPr/>
+                    <a:lstStyle/>
+                    <a:p>
+                      <a:pPr lvl="0" algn="ctr" defTabSz="914400">
+                        <a:defRPr b="0" i="0" sz="1800"/>
+                      </a:pPr>
+                      <a:r>
+                        <a:rPr sz="2600">
+                          <a:latin typeface="Helvetica Light"/>
+                          <a:ea typeface="Helvetica Light"/>
+                          <a:cs typeface="Helvetica Light"/>
+                          <a:sym typeface="Helvetica Light"/>
+                        </a:rPr>
+                        <a:t>INT</a:t>
+                      </a:r>
+                    </a:p>
+                  </a:txBody>
+                  <a:tcPr marL="50800" marR="50800" marT="50800" marB="50800" anchor="ctr" anchorCtr="0" horzOverflow="overflow">
+                    <a:lnL w="12700">
+                      <a:miter lim="400000"/>
+                    </a:lnL>
+                    <a:lnR w="12700">
+                      <a:miter lim="400000"/>
+                    </a:lnR>
+                    <a:lnT w="12700">
+                      <a:miter lim="400000"/>
+                    </a:lnT>
+                    <a:lnB w="12700">
+                      <a:miter lim="400000"/>
+                    </a:lnB>
+                  </a:tcPr>
+                </a:tc>
+                <a:tc>
+                  <a:txBody>
+                    <a:bodyPr/>
+                    <a:lstStyle/>
+                    <a:p>
+                      <a:pPr lvl="0" algn="ctr" defTabSz="914400">
+                        <a:defRPr b="0" i="0" sz="1800"/>
+                      </a:pPr>
+                      <a:r>
+                        <a:rPr sz="2600">
+                          <a:latin typeface="Helvetica Light"/>
+                          <a:ea typeface="Helvetica Light"/>
+                          <a:cs typeface="Helvetica Light"/>
+                          <a:sym typeface="Helvetica Light"/>
+                        </a:rPr>
+                        <a:t>NOT NULL</a:t>
                       </a:r>
                       <a:endParaRPr sz="2600">
                         <a:latin typeface="Helvetica Light"/>
                         <a:ea typeface="Helvetica Light"/>
                         <a:cs typeface="Helvetica Light"/>
+                        <a:sym typeface="Helvetica Light"/>
                       </a:endParaRPr>
                     </a:p>
                     <a:p>
                       <a:pPr lvl="0" algn="ctr" defTabSz="914400">
                         <a:defRPr b="0" i="0" sz="1800"/>
                       </a:pPr>
-                      <a:endParaRPr sz="2600">
-                        <a:latin typeface="Helvetica Light"/>
-                        <a:ea typeface="Helvetica Light"/>
-                        <a:cs typeface="Helvetica Light"/>
-                      </a:endParaRPr>
+                      <a:r>
+                        <a:rPr sz="2600">
+                          <a:latin typeface="Helvetica Light"/>
+                          <a:ea typeface="Helvetica Light"/>
+                          <a:cs typeface="Helvetica Light"/>
+                          <a:sym typeface="Helvetica Light"/>
+                        </a:rPr>
+                        <a:t>FOREIGN KEY</a:t>
+                      </a:r>
+                    </a:p>
+                  </a:txBody>
+                  <a:tcPr marL="50800" marR="50800" marT="50800" marB="50800" anchor="ctr" anchorCtr="0" horzOverflow="overflow">
+                    <a:lnL w="12700">
+                      <a:miter lim="400000"/>
+                    </a:lnL>
+                    <a:lnR w="12700">
+                      <a:miter lim="400000"/>
+                    </a:lnR>
+                    <a:lnT w="12700">
+                      <a:miter lim="400000"/>
+                    </a:lnT>
+                    <a:lnB w="12700">
+                      <a:miter lim="400000"/>
+                    </a:lnB>
+                  </a:tcPr>
+                </a:tc>
+                <a:tc>
+                  <a:txBody>
+                    <a:bodyPr/>
+                    <a:lstStyle/>
+                    <a:p>
+                      <a:pPr lvl="0" algn="ctr" defTabSz="914400">
+                        <a:defRPr b="0" i="0" sz="1800"/>
+                      </a:pPr>
+                      <a:r>
+                        <a:rPr sz="2600">
+                          <a:latin typeface="Helvetica Light"/>
+                          <a:ea typeface="Helvetica Light"/>
+                          <a:cs typeface="Helvetica Light"/>
+                          <a:sym typeface="Helvetica Light"/>
+                        </a:rPr>
+                        <a:t>ID of the student/teacher that lodged the complaint</a:t>
+                      </a:r>
                     </a:p>
                   </a:txBody>
                   <a:tcPr marL="50800" marR="50800" marT="50800" marB="50800" anchor="ctr" anchorCtr="0" horzOverflow="overflow">
@@ -3557,158 +3755,7 @@
                           <a:latin typeface="Helvetica Light"/>
                           <a:ea typeface="Helvetica Light"/>
                           <a:cs typeface="Helvetica Light"/>
-                        </a:rPr>
-                        <a:t>Complainer_ID</a:t>
-                      </a:r>
-                    </a:p>
-                  </a:txBody>
-                  <a:tcPr marL="50800" marR="50800" marT="50800" marB="50800" anchor="ctr" anchorCtr="0" horzOverflow="overflow">
-                    <a:lnL w="12700">
-                      <a:miter lim="400000"/>
-                    </a:lnL>
-                    <a:lnR w="12700">
-                      <a:miter lim="400000"/>
-                    </a:lnR>
-                    <a:lnT w="12700">
-                      <a:miter lim="400000"/>
-                    </a:lnT>
-                    <a:lnB w="12700">
-                      <a:miter lim="400000"/>
-                    </a:lnB>
-                  </a:tcPr>
-                </a:tc>
-                <a:tc>
-                  <a:txBody>
-                    <a:bodyPr/>
-                    <a:lstStyle/>
-                    <a:p>
-                      <a:pPr lvl="0" algn="ctr" defTabSz="914400">
-                        <a:defRPr b="0" i="0" sz="1800"/>
-                      </a:pPr>
-                      <a:r>
-                        <a:rPr sz="2600">
-                          <a:latin typeface="Helvetica Light"/>
-                          <a:ea typeface="Helvetica Light"/>
-                          <a:cs typeface="Helvetica Light"/>
-                        </a:rPr>
-                        <a:t>INT</a:t>
-                      </a:r>
-                    </a:p>
-                  </a:txBody>
-                  <a:tcPr marL="50800" marR="50800" marT="50800" marB="50800" anchor="ctr" anchorCtr="0" horzOverflow="overflow">
-                    <a:lnL w="12700">
-                      <a:miter lim="400000"/>
-                    </a:lnL>
-                    <a:lnR w="12700">
-                      <a:miter lim="400000"/>
-                    </a:lnR>
-                    <a:lnT w="12700">
-                      <a:miter lim="400000"/>
-                    </a:lnT>
-                    <a:lnB w="12700">
-                      <a:miter lim="400000"/>
-                    </a:lnB>
-                  </a:tcPr>
-                </a:tc>
-                <a:tc>
-                  <a:txBody>
-                    <a:bodyPr/>
-                    <a:lstStyle/>
-                    <a:p>
-                      <a:pPr lvl="0" algn="ctr" defTabSz="914400">
-                        <a:defRPr b="0" i="0" sz="1800"/>
-                      </a:pPr>
-                      <a:r>
-                        <a:rPr sz="2600">
-                          <a:latin typeface="Helvetica Light"/>
-                          <a:ea typeface="Helvetica Light"/>
-                          <a:cs typeface="Helvetica Light"/>
-                        </a:rPr>
-                        <a:t>NOT NULL</a:t>
-                      </a:r>
-                      <a:endParaRPr sz="2600">
-                        <a:latin typeface="Helvetica Light"/>
-                        <a:ea typeface="Helvetica Light"/>
-                        <a:cs typeface="Helvetica Light"/>
-                      </a:endParaRPr>
-                    </a:p>
-                    <a:p>
-                      <a:pPr lvl="0" algn="ctr" defTabSz="914400">
-                        <a:defRPr b="0" i="0" sz="1800"/>
-                      </a:pPr>
-                      <a:r>
-                        <a:rPr sz="2600">
-                          <a:latin typeface="Helvetica Light"/>
-                          <a:ea typeface="Helvetica Light"/>
-                          <a:cs typeface="Helvetica Light"/>
-                        </a:rPr>
-                        <a:t>FOREIGN KEY</a:t>
-                      </a:r>
-                    </a:p>
-                  </a:txBody>
-                  <a:tcPr marL="50800" marR="50800" marT="50800" marB="50800" anchor="ctr" anchorCtr="0" horzOverflow="overflow">
-                    <a:lnL w="12700">
-                      <a:miter lim="400000"/>
-                    </a:lnL>
-                    <a:lnR w="12700">
-                      <a:miter lim="400000"/>
-                    </a:lnR>
-                    <a:lnT w="12700">
-                      <a:miter lim="400000"/>
-                    </a:lnT>
-                    <a:lnB w="12700">
-                      <a:miter lim="400000"/>
-                    </a:lnB>
-                  </a:tcPr>
-                </a:tc>
-                <a:tc>
-                  <a:txBody>
-                    <a:bodyPr/>
-                    <a:lstStyle/>
-                    <a:p>
-                      <a:pPr lvl="0" algn="ctr" defTabSz="914400">
-                        <a:defRPr b="0" i="0" sz="1800"/>
-                      </a:pPr>
-                      <a:r>
-                        <a:rPr sz="2600">
-                          <a:latin typeface="Helvetica Light"/>
-                          <a:ea typeface="Helvetica Light"/>
-                          <a:cs typeface="Helvetica Light"/>
-                        </a:rPr>
-                        <a:t>ID of the student/teacher that lodged the complaint</a:t>
-                      </a:r>
-                    </a:p>
-                  </a:txBody>
-                  <a:tcPr marL="50800" marR="50800" marT="50800" marB="50800" anchor="ctr" anchorCtr="0" horzOverflow="overflow">
-                    <a:lnL w="12700">
-                      <a:miter lim="400000"/>
-                    </a:lnL>
-                    <a:lnR w="12700">
-                      <a:miter lim="400000"/>
-                    </a:lnR>
-                    <a:lnT w="12700">
-                      <a:miter lim="400000"/>
-                    </a:lnT>
-                    <a:lnB w="12700">
-                      <a:miter lim="400000"/>
-                    </a:lnB>
-                  </a:tcPr>
-                </a:tc>
-              </a:tr>
-              <a:tr h="943312">
-                <a:tc>
-                  <a:txBody>
-                    <a:bodyPr/>
-                    <a:lstStyle/>
-                    <a:p>
-                      <a:pPr lvl="0" algn="ctr" defTabSz="914400">
-                        <a:defRPr b="0" i="0" sz="1800"/>
-                      </a:pPr>
-                      <a:r>
-                        <a:rPr sz="2600">
-                          <a:latin typeface="Helvetica Light"/>
-                          <a:ea typeface="Helvetica Light"/>
-                          <a:cs typeface="Helvetica Light"/>
+                          <a:sym typeface="Helvetica Light"/>
                         </a:rPr>
                         <a:t>Date_of_Approval</a:t>
                       </a:r>
@@ -3742,6 +3789,7 @@
                           <a:latin typeface="Helvetica Light"/>
                           <a:ea typeface="Helvetica Light"/>
                           <a:cs typeface="Helvetica Light"/>
+                          <a:sym typeface="Helvetica Light"/>
                         </a:rPr>
                         <a:t>DATE</a:t>
                       </a:r>
@@ -3775,6 +3823,7 @@
                           <a:latin typeface="Helvetica Light"/>
                           <a:ea typeface="Helvetica Light"/>
                           <a:cs typeface="Helvetica Light"/>
+                          <a:sym typeface="Helvetica Light"/>
                         </a:rPr>
                         <a:t>&gt;= date of complaint</a:t>
                       </a:r>
@@ -3808,6 +3857,7 @@
                           <a:latin typeface="Helvetica Light"/>
                           <a:ea typeface="Helvetica Light"/>
                           <a:cs typeface="Helvetica Light"/>
+                          <a:sym typeface="Helvetica Light"/>
                         </a:rPr>
                         <a:t>date of approval if the complaint was approved</a:t>
                       </a:r>
@@ -3843,6 +3893,7 @@
                           <a:latin typeface="Helvetica Light"/>
                           <a:ea typeface="Helvetica Light"/>
                           <a:cs typeface="Helvetica Light"/>
+                          <a:sym typeface="Helvetica Light"/>
                         </a:rPr>
                         <a:t>Priority</a:t>
                       </a:r>
@@ -3876,6 +3927,7 @@
                           <a:latin typeface="Helvetica Light"/>
                           <a:ea typeface="Helvetica Light"/>
                           <a:cs typeface="Helvetica Light"/>
+                          <a:sym typeface="Helvetica Light"/>
                         </a:rPr>
                         <a:t>INT</a:t>
                       </a:r>
@@ -3909,6 +3961,7 @@
                           <a:latin typeface="Helvetica Light"/>
                           <a:ea typeface="Helvetica Light"/>
                           <a:cs typeface="Helvetica Light"/>
+                          <a:sym typeface="Helvetica Light"/>
                         </a:rPr>
                         <a:t>NOT NULL</a:t>
                       </a:r>
@@ -3942,6 +3995,7 @@
                           <a:latin typeface="Helvetica Light"/>
                           <a:ea typeface="Helvetica Light"/>
                           <a:cs typeface="Helvetica Light"/>
+                          <a:sym typeface="Helvetica Light"/>
                         </a:rPr>
                         <a:t>priority of the complaint assigned by lab admin</a:t>
                       </a:r>
@@ -4003,8 +4057,8 @@
         </p:nvSpPr>
         <p:spPr>
           <a:xfrm>
-            <a:off x="396356" y="119247"/>
-            <a:ext cx="12212088" cy="9373627"/>
+            <a:off x="396356" y="119246"/>
+            <a:ext cx="12212088" cy="9373629"/>
           </a:xfrm>
           <a:prstGeom prst="rect">
             <a:avLst/>
@@ -4052,7 +4106,7 @@
         </p:nvGraphicFramePr>
         <p:xfrm>
           <a:off x="673539" y="1494650"/>
-          <a:ext cx="11670422" cy="7885142"/>
+          <a:ext cx="11670422" cy="7885143"/>
         </p:xfrm>
         <a:graphic xmlns:a="http://schemas.openxmlformats.org/drawingml/2006/main">
           <a:graphicData uri="http://schemas.openxmlformats.org/drawingml/2006/table">
@@ -4097,6 +4151,7 @@
                           <a:latin typeface="Helvetica Light"/>
                           <a:ea typeface="Helvetica Light"/>
                           <a:cs typeface="Helvetica Light"/>
+                          <a:sym typeface="Helvetica Light"/>
                         </a:rPr>
                         <a:t>Name</a:t>
                       </a:r>
@@ -4150,6 +4205,7 @@
                           <a:latin typeface="Helvetica Light"/>
                           <a:ea typeface="Helvetica Light"/>
                           <a:cs typeface="Helvetica Light"/>
+                          <a:sym typeface="Helvetica Light"/>
                         </a:rPr>
                         <a:t>Data Type</a:t>
                       </a:r>
@@ -4203,6 +4259,7 @@
                           <a:latin typeface="Helvetica Light"/>
                           <a:ea typeface="Helvetica Light"/>
                           <a:cs typeface="Helvetica Light"/>
+                          <a:sym typeface="Helvetica Light"/>
                         </a:rPr>
                         <a:t>Constraints</a:t>
                       </a:r>
@@ -4256,6 +4313,7 @@
                           <a:latin typeface="Helvetica Light"/>
                           <a:ea typeface="Helvetica Light"/>
                           <a:cs typeface="Helvetica Light"/>
+                          <a:sym typeface="Helvetica Light"/>
                         </a:rPr>
                         <a:t>Details</a:t>
                       </a:r>
@@ -4294,6 +4352,7 @@
                           <a:latin typeface="Helvetica Light"/>
                           <a:ea typeface="Helvetica Light"/>
                           <a:cs typeface="Helvetica Light"/>
+                          <a:sym typeface="Helvetica Light"/>
                         </a:rPr>
                         <a:t>Name</a:t>
                       </a:r>
@@ -4327,6 +4386,7 @@
                           <a:latin typeface="Helvetica Light"/>
                           <a:ea typeface="Helvetica Light"/>
                           <a:cs typeface="Helvetica Light"/>
+                          <a:sym typeface="Helvetica Light"/>
                         </a:rPr>
                         <a:t>varchar(40)</a:t>
                       </a:r>
@@ -4360,6 +4420,7 @@
                           <a:latin typeface="Helvetica Light"/>
                           <a:ea typeface="Helvetica Light"/>
                           <a:cs typeface="Helvetica Light"/>
+                          <a:sym typeface="Helvetica Light"/>
                         </a:rPr>
                         <a:t>NOT NULL</a:t>
                       </a:r>
@@ -4393,6 +4454,7 @@
                           <a:latin typeface="Helvetica Light"/>
                           <a:ea typeface="Helvetica Light"/>
                           <a:cs typeface="Helvetica Light"/>
+                          <a:sym typeface="Helvetica Light"/>
                         </a:rPr>
                         <a:t>Name of the Lab Admin</a:t>
                       </a:r>
@@ -4428,6 +4490,7 @@
                           <a:latin typeface="Helvetica Light"/>
                           <a:ea typeface="Helvetica Light"/>
                           <a:cs typeface="Helvetica Light"/>
+                          <a:sym typeface="Helvetica Light"/>
                         </a:rPr>
                         <a:t>Lab_admin_ID</a:t>
                       </a:r>
@@ -4461,6 +4524,7 @@
                           <a:latin typeface="Helvetica Light"/>
                           <a:ea typeface="Helvetica Light"/>
                           <a:cs typeface="Helvetica Light"/>
+                          <a:sym typeface="Helvetica Light"/>
                         </a:rPr>
                         <a:t>INT</a:t>
                       </a:r>
@@ -4494,6 +4558,7 @@
                           <a:latin typeface="Helvetica Light"/>
                           <a:ea typeface="Helvetica Light"/>
                           <a:cs typeface="Helvetica Light"/>
+                          <a:sym typeface="Helvetica Light"/>
                         </a:rPr>
                         <a:t>NOT NULL</a:t>
                       </a:r>
@@ -4501,6 +4566,7 @@
                         <a:latin typeface="Helvetica Light"/>
                         <a:ea typeface="Helvetica Light"/>
                         <a:cs typeface="Helvetica Light"/>
+                        <a:sym typeface="Helvetica Light"/>
                       </a:endParaRPr>
                     </a:p>
                     <a:p>
@@ -4512,6 +4578,7 @@
                           <a:latin typeface="Helvetica Light"/>
                           <a:ea typeface="Helvetica Light"/>
                           <a:cs typeface="Helvetica Light"/>
+                          <a:sym typeface="Helvetica Light"/>
                         </a:rPr>
                         <a:t>UNIQUE</a:t>
                       </a:r>
@@ -4545,6 +4612,7 @@
                           <a:latin typeface="Helvetica Light"/>
                           <a:ea typeface="Helvetica Light"/>
                           <a:cs typeface="Helvetica Light"/>
+                          <a:sym typeface="Helvetica Light"/>
                         </a:rPr>
                         <a:t>Uniquely identify each lab admin</a:t>
                       </a:r>
@@ -4580,6 +4648,7 @@
                           <a:latin typeface="Helvetica Light"/>
                           <a:ea typeface="Helvetica Light"/>
                           <a:cs typeface="Helvetica Light"/>
+                          <a:sym typeface="Helvetica Light"/>
                         </a:rPr>
                         <a:t>Lab_ID</a:t>
                       </a:r>
@@ -4613,6 +4682,7 @@
                           <a:latin typeface="Helvetica Light"/>
                           <a:ea typeface="Helvetica Light"/>
                           <a:cs typeface="Helvetica Light"/>
+                          <a:sym typeface="Helvetica Light"/>
                         </a:rPr>
                         <a:t>INT</a:t>
                       </a:r>
@@ -4646,6 +4716,7 @@
                           <a:latin typeface="Helvetica Light"/>
                           <a:ea typeface="Helvetica Light"/>
                           <a:cs typeface="Helvetica Light"/>
+                          <a:sym typeface="Helvetica Light"/>
                         </a:rPr>
                         <a:t>NOT NULL</a:t>
                       </a:r>
@@ -4653,6 +4724,7 @@
                         <a:latin typeface="Helvetica Light"/>
                         <a:ea typeface="Helvetica Light"/>
                         <a:cs typeface="Helvetica Light"/>
+                        <a:sym typeface="Helvetica Light"/>
                       </a:endParaRPr>
                     </a:p>
                     <a:p>
@@ -4664,6 +4736,7 @@
                           <a:latin typeface="Helvetica Light"/>
                           <a:ea typeface="Helvetica Light"/>
                           <a:cs typeface="Helvetica Light"/>
+                          <a:sym typeface="Helvetica Light"/>
                         </a:rPr>
                         <a:t>FOREIGN KEY</a:t>
                       </a:r>
@@ -4697,6 +4770,7 @@
                           <a:latin typeface="Helvetica Light"/>
                           <a:ea typeface="Helvetica Light"/>
                           <a:cs typeface="Helvetica Light"/>
+                          <a:sym typeface="Helvetica Light"/>
                         </a:rPr>
                         <a:t>identify the lab of which the person is admin of.</a:t>
                       </a:r>
@@ -4732,6 +4806,7 @@
                           <a:latin typeface="Helvetica Light"/>
                           <a:ea typeface="Helvetica Light"/>
                           <a:cs typeface="Helvetica Light"/>
+                          <a:sym typeface="Helvetica Light"/>
                         </a:rPr>
                         <a:t>No_of_complaints_handled</a:t>
                       </a:r>
@@ -4765,6 +4840,7 @@
                           <a:latin typeface="Helvetica Light"/>
                           <a:ea typeface="Helvetica Light"/>
                           <a:cs typeface="Helvetica Light"/>
+                          <a:sym typeface="Helvetica Light"/>
                         </a:rPr>
                         <a:t>INT</a:t>
                       </a:r>
@@ -4798,6 +4874,7 @@
                           <a:latin typeface="Helvetica Light"/>
                           <a:ea typeface="Helvetica Light"/>
                           <a:cs typeface="Helvetica Light"/>
+                          <a:sym typeface="Helvetica Light"/>
                         </a:rPr>
                         <a:t>NON NEGATIVE</a:t>
                       </a:r>
@@ -4831,6 +4908,7 @@
                           <a:latin typeface="Helvetica Light"/>
                           <a:ea typeface="Helvetica Light"/>
                           <a:cs typeface="Helvetica Light"/>
+                          <a:sym typeface="Helvetica Light"/>
                         </a:rPr>
                         <a:t>no of complaints handled after verification of complaint</a:t>
                       </a:r>
@@ -4866,6 +4944,7 @@
                           <a:latin typeface="Helvetica Light"/>
                           <a:ea typeface="Helvetica Light"/>
                           <a:cs typeface="Helvetica Light"/>
+                          <a:sym typeface="Helvetica Light"/>
                         </a:rPr>
                         <a:t>Last_login</a:t>
                       </a:r>
@@ -4899,6 +4978,7 @@
                           <a:latin typeface="Helvetica Light"/>
                           <a:ea typeface="Helvetica Light"/>
                           <a:cs typeface="Helvetica Light"/>
+                          <a:sym typeface="Helvetica Light"/>
                         </a:rPr>
                         <a:t>DATE</a:t>
                       </a:r>
@@ -4928,11 +5008,6 @@
                         <a:defRPr b="0" i="0" sz="1800"/>
                       </a:pPr>
                       <a:r>
-                        <a:rPr sz="2600">
-                          <a:latin typeface="Helvetica Light"/>
-                          <a:ea typeface="Helvetica Light"/>
-                          <a:cs typeface="Helvetica Light"/>
-                        </a:rPr>
                         <a:t/>
                       </a:r>
                     </a:p>
@@ -4965,6 +5040,7 @@
                           <a:latin typeface="Helvetica Light"/>
                           <a:ea typeface="Helvetica Light"/>
                           <a:cs typeface="Helvetica Light"/>
+                          <a:sym typeface="Helvetica Light"/>
                         </a:rPr>
                         <a:t>Indicates how active the admin is</a:t>
                       </a:r>
@@ -5062,7 +5138,7 @@
         <p:spPr>
           <a:xfrm>
             <a:off x="1270000" y="1811371"/>
-            <a:ext cx="10464800" cy="6589742"/>
+            <a:ext cx="10464800" cy="6589743"/>
           </a:xfrm>
           <a:prstGeom prst="rect">
             <a:avLst/>
@@ -5130,8 +5206,8 @@
         </p:nvSpPr>
         <p:spPr>
           <a:xfrm>
-            <a:off x="396356" y="119247"/>
-            <a:ext cx="12212088" cy="9373627"/>
+            <a:off x="396356" y="119246"/>
+            <a:ext cx="12212088" cy="9373629"/>
           </a:xfrm>
           <a:prstGeom prst="rect">
             <a:avLst/>
@@ -5214,6 +5290,7 @@
                           <a:latin typeface="Helvetica Light"/>
                           <a:ea typeface="Helvetica Light"/>
                           <a:cs typeface="Helvetica Light"/>
+                          <a:sym typeface="Helvetica Light"/>
                         </a:rPr>
                         <a:t>Name</a:t>
                       </a:r>
@@ -5267,6 +5344,7 @@
                           <a:latin typeface="Helvetica Light"/>
                           <a:ea typeface="Helvetica Light"/>
                           <a:cs typeface="Helvetica Light"/>
+                          <a:sym typeface="Helvetica Light"/>
                         </a:rPr>
                         <a:t>Data Type</a:t>
                       </a:r>
@@ -5320,6 +5398,7 @@
                           <a:latin typeface="Helvetica Light"/>
                           <a:ea typeface="Helvetica Light"/>
                           <a:cs typeface="Helvetica Light"/>
+                          <a:sym typeface="Helvetica Light"/>
                         </a:rPr>
                         <a:t>Constraints</a:t>
                       </a:r>
@@ -5373,6 +5452,7 @@
                           <a:latin typeface="Helvetica Light"/>
                           <a:ea typeface="Helvetica Light"/>
                           <a:cs typeface="Helvetica Light"/>
+                          <a:sym typeface="Helvetica Light"/>
                         </a:rPr>
                         <a:t>Details</a:t>
                       </a:r>
@@ -5411,6 +5491,7 @@
                           <a:latin typeface="Helvetica Light"/>
                           <a:ea typeface="Helvetica Light"/>
                           <a:cs typeface="Helvetica Light"/>
+                          <a:sym typeface="Helvetica Light"/>
                         </a:rPr>
                         <a:t>Lab_ID</a:t>
                       </a:r>
@@ -5444,6 +5525,7 @@
                           <a:latin typeface="Helvetica Light"/>
                           <a:ea typeface="Helvetica Light"/>
                           <a:cs typeface="Helvetica Light"/>
+                          <a:sym typeface="Helvetica Light"/>
                         </a:rPr>
                         <a:t>INT</a:t>
                       </a:r>
@@ -5477,6 +5559,7 @@
                           <a:latin typeface="Helvetica Light"/>
                           <a:ea typeface="Helvetica Light"/>
                           <a:cs typeface="Helvetica Light"/>
+                          <a:sym typeface="Helvetica Light"/>
                         </a:rPr>
                         <a:t>NOT NULL</a:t>
                       </a:r>
@@ -5484,6 +5567,7 @@
                         <a:latin typeface="Helvetica Light"/>
                         <a:ea typeface="Helvetica Light"/>
                         <a:cs typeface="Helvetica Light"/>
+                        <a:sym typeface="Helvetica Light"/>
                       </a:endParaRPr>
                     </a:p>
                     <a:p>
@@ -5495,6 +5579,7 @@
                           <a:latin typeface="Helvetica Light"/>
                           <a:ea typeface="Helvetica Light"/>
                           <a:cs typeface="Helvetica Light"/>
+                          <a:sym typeface="Helvetica Light"/>
                         </a:rPr>
                         <a:t>PRIMARY KEY</a:t>
                       </a:r>
@@ -5528,6 +5613,7 @@
                           <a:latin typeface="Helvetica Light"/>
                           <a:ea typeface="Helvetica Light"/>
                           <a:cs typeface="Helvetica Light"/>
+                          <a:sym typeface="Helvetica Light"/>
                         </a:rPr>
                         <a:t>used to identify the location of the lab</a:t>
                       </a:r>
@@ -5563,6 +5649,7 @@
                           <a:latin typeface="Helvetica Light"/>
                           <a:ea typeface="Helvetica Light"/>
                           <a:cs typeface="Helvetica Light"/>
+                          <a:sym typeface="Helvetica Light"/>
                         </a:rPr>
                         <a:t>No_of_pcs</a:t>
                       </a:r>
@@ -5596,6 +5683,7 @@
                           <a:latin typeface="Helvetica Light"/>
                           <a:ea typeface="Helvetica Light"/>
                           <a:cs typeface="Helvetica Light"/>
+                          <a:sym typeface="Helvetica Light"/>
                         </a:rPr>
                         <a:t>INT</a:t>
                       </a:r>
@@ -5629,6 +5717,7 @@
                           <a:latin typeface="Helvetica Light"/>
                           <a:ea typeface="Helvetica Light"/>
                           <a:cs typeface="Helvetica Light"/>
+                          <a:sym typeface="Helvetica Light"/>
                         </a:rPr>
                         <a:t>NOT NULL</a:t>
                       </a:r>
@@ -5636,6 +5725,7 @@
                         <a:latin typeface="Helvetica Light"/>
                         <a:ea typeface="Helvetica Light"/>
                         <a:cs typeface="Helvetica Light"/>
+                        <a:sym typeface="Helvetica Light"/>
                       </a:endParaRPr>
                     </a:p>
                     <a:p>
@@ -5647,6 +5737,7 @@
                           <a:latin typeface="Helvetica Light"/>
                           <a:ea typeface="Helvetica Light"/>
                           <a:cs typeface="Helvetica Light"/>
+                          <a:sym typeface="Helvetica Light"/>
                         </a:rPr>
                         <a:t>POSITIVE</a:t>
                       </a:r>
@@ -5680,6 +5771,7 @@
                           <a:latin typeface="Helvetica Light"/>
                           <a:ea typeface="Helvetica Light"/>
                           <a:cs typeface="Helvetica Light"/>
+                          <a:sym typeface="Helvetica Light"/>
                         </a:rPr>
                         <a:t>no of computers in the labs</a:t>
                       </a:r>
@@ -5715,6 +5807,7 @@
                           <a:latin typeface="Helvetica Light"/>
                           <a:ea typeface="Helvetica Light"/>
                           <a:cs typeface="Helvetica Light"/>
+                          <a:sym typeface="Helvetica Light"/>
                         </a:rPr>
                         <a:t>Lab_admin_ID</a:t>
                       </a:r>
@@ -5748,6 +5841,7 @@
                           <a:latin typeface="Helvetica Light"/>
                           <a:ea typeface="Helvetica Light"/>
                           <a:cs typeface="Helvetica Light"/>
+                          <a:sym typeface="Helvetica Light"/>
                         </a:rPr>
                         <a:t>INT</a:t>
                       </a:r>
@@ -5781,6 +5875,7 @@
                           <a:latin typeface="Helvetica Light"/>
                           <a:ea typeface="Helvetica Light"/>
                           <a:cs typeface="Helvetica Light"/>
+                          <a:sym typeface="Helvetica Light"/>
                         </a:rPr>
                         <a:t>NOT NULL</a:t>
                       </a:r>
@@ -5788,6 +5883,7 @@
                         <a:latin typeface="Helvetica Light"/>
                         <a:ea typeface="Helvetica Light"/>
                         <a:cs typeface="Helvetica Light"/>
+                        <a:sym typeface="Helvetica Light"/>
                       </a:endParaRPr>
                     </a:p>
                     <a:p>
@@ -5799,6 +5895,7 @@
                           <a:latin typeface="Helvetica Light"/>
                           <a:ea typeface="Helvetica Light"/>
                           <a:cs typeface="Helvetica Light"/>
+                          <a:sym typeface="Helvetica Light"/>
                         </a:rPr>
                         <a:t>FOREIGN KEY</a:t>
                       </a:r>
@@ -5832,6 +5929,7 @@
                           <a:latin typeface="Helvetica Light"/>
                           <a:ea typeface="Helvetica Light"/>
                           <a:cs typeface="Helvetica Light"/>
+                          <a:sym typeface="Helvetica Light"/>
                         </a:rPr>
                         <a:t>id of the lab incharge</a:t>
                       </a:r>
@@ -5893,8 +5991,8 @@
         </p:nvSpPr>
         <p:spPr>
           <a:xfrm>
-            <a:off x="396356" y="119247"/>
-            <a:ext cx="12212088" cy="9373627"/>
+            <a:off x="396356" y="119246"/>
+            <a:ext cx="12212088" cy="9373629"/>
           </a:xfrm>
           <a:prstGeom prst="rect">
             <a:avLst/>
@@ -5931,8 +6029,8 @@
           <p:nvPr/>
         </p:nvGraphicFramePr>
         <p:xfrm>
-          <a:off x="667189" y="1735951"/>
-          <a:ext cx="11670422" cy="6864079"/>
+          <a:off x="667189" y="2129651"/>
+          <a:ext cx="11670422" cy="5171858"/>
         </p:xfrm>
         <a:graphic xmlns:a="http://schemas.openxmlformats.org/drawingml/2006/main">
           <a:graphicData uri="http://schemas.openxmlformats.org/drawingml/2006/table">
@@ -5946,7 +6044,7 @@
                 <a:gridCol w="2442641"/>
                 <a:gridCol w="4229758"/>
               </a:tblGrid>
-              <a:tr h="908078">
+              <a:tr h="1299791">
                 <a:tc>
                   <a:txBody>
                     <a:bodyPr/>
@@ -5977,6 +6075,7 @@
                           <a:latin typeface="Helvetica Light"/>
                           <a:ea typeface="Helvetica Light"/>
                           <a:cs typeface="Helvetica Light"/>
+                          <a:sym typeface="Helvetica Light"/>
                         </a:rPr>
                         <a:t>Name</a:t>
                       </a:r>
@@ -6030,6 +6129,7 @@
                           <a:latin typeface="Helvetica Light"/>
                           <a:ea typeface="Helvetica Light"/>
                           <a:cs typeface="Helvetica Light"/>
+                          <a:sym typeface="Helvetica Light"/>
                         </a:rPr>
                         <a:t>Data Type</a:t>
                       </a:r>
@@ -6083,6 +6183,7 @@
                           <a:latin typeface="Helvetica Light"/>
                           <a:ea typeface="Helvetica Light"/>
                           <a:cs typeface="Helvetica Light"/>
+                          <a:sym typeface="Helvetica Light"/>
                         </a:rPr>
                         <a:t>Constraints</a:t>
                       </a:r>
@@ -6136,6 +6237,7 @@
                           <a:latin typeface="Helvetica Light"/>
                           <a:ea typeface="Helvetica Light"/>
                           <a:cs typeface="Helvetica Light"/>
+                          <a:sym typeface="Helvetica Light"/>
                         </a:rPr>
                         <a:t>Details</a:t>
                       </a:r>
@@ -6160,20 +6262,21 @@
                   </a:tcPr>
                 </a:tc>
               </a:tr>
-              <a:tr h="908078">
-                <a:tc>
-                  <a:txBody>
-                    <a:bodyPr/>
-                    <a:lstStyle/>
-                    <a:p>
-                      <a:pPr lvl="0" algn="ctr" defTabSz="914400">
-                        <a:defRPr b="0" i="0" sz="1800"/>
-                      </a:pPr>
-                      <a:r>
-                        <a:rPr sz="2600">
-                          <a:latin typeface="Helvetica Light"/>
-                          <a:ea typeface="Helvetica Light"/>
-                          <a:cs typeface="Helvetica Light"/>
+              <a:tr h="1299791">
+                <a:tc>
+                  <a:txBody>
+                    <a:bodyPr/>
+                    <a:lstStyle/>
+                    <a:p>
+                      <a:pPr lvl="0" algn="ctr" defTabSz="914400">
+                        <a:defRPr b="0" i="0" sz="1800"/>
+                      </a:pPr>
+                      <a:r>
+                        <a:rPr sz="2600">
+                          <a:latin typeface="Helvetica Light"/>
+                          <a:ea typeface="Helvetica Light"/>
+                          <a:cs typeface="Helvetica Light"/>
+                          <a:sym typeface="Helvetica Light"/>
                         </a:rPr>
                         <a:t>PC_ID</a:t>
                       </a:r>
@@ -6207,6 +6310,7 @@
                           <a:latin typeface="Helvetica Light"/>
                           <a:ea typeface="Helvetica Light"/>
                           <a:cs typeface="Helvetica Light"/>
+                          <a:sym typeface="Helvetica Light"/>
                         </a:rPr>
                         <a:t>INT</a:t>
                       </a:r>
@@ -6240,6 +6344,7 @@
                           <a:latin typeface="Helvetica Light"/>
                           <a:ea typeface="Helvetica Light"/>
                           <a:cs typeface="Helvetica Light"/>
+                          <a:sym typeface="Helvetica Light"/>
                         </a:rPr>
                         <a:t>PRIMARY KEY</a:t>
                       </a:r>
@@ -6247,6 +6352,7 @@
                         <a:latin typeface="Helvetica Light"/>
                         <a:ea typeface="Helvetica Light"/>
                         <a:cs typeface="Helvetica Light"/>
+                        <a:sym typeface="Helvetica Light"/>
                       </a:endParaRPr>
                     </a:p>
                     <a:p>
@@ -6258,6 +6364,7 @@
                           <a:latin typeface="Helvetica Light"/>
                           <a:ea typeface="Helvetica Light"/>
                           <a:cs typeface="Helvetica Light"/>
+                          <a:sym typeface="Helvetica Light"/>
                         </a:rPr>
                         <a:t>NOT NULL</a:t>
                       </a:r>
@@ -6294,6 +6401,7 @@
                           <a:latin typeface="Helvetica Light"/>
                           <a:ea typeface="Helvetica Light"/>
                           <a:cs typeface="Helvetica Light"/>
+                          <a:sym typeface="Helvetica Light"/>
                         </a:rPr>
                         <a:t>Will be used to identify any specific PC set </a:t>
                       </a:r>
@@ -6315,20 +6423,21 @@
                   </a:tcPr>
                 </a:tc>
               </a:tr>
-              <a:tr h="908078">
-                <a:tc>
-                  <a:txBody>
-                    <a:bodyPr/>
-                    <a:lstStyle/>
-                    <a:p>
-                      <a:pPr lvl="0" algn="ctr" defTabSz="914400">
-                        <a:defRPr b="0" i="0" sz="1800"/>
-                      </a:pPr>
-                      <a:r>
-                        <a:rPr sz="2600">
-                          <a:latin typeface="Helvetica Light"/>
-                          <a:ea typeface="Helvetica Light"/>
-                          <a:cs typeface="Helvetica Light"/>
+              <a:tr h="1299791">
+                <a:tc>
+                  <a:txBody>
+                    <a:bodyPr/>
+                    <a:lstStyle/>
+                    <a:p>
+                      <a:pPr lvl="0" algn="ctr" defTabSz="914400">
+                        <a:defRPr b="0" i="0" sz="1800"/>
+                      </a:pPr>
+                      <a:r>
+                        <a:rPr sz="2600">
+                          <a:latin typeface="Helvetica Light"/>
+                          <a:ea typeface="Helvetica Light"/>
+                          <a:cs typeface="Helvetica Light"/>
+                          <a:sym typeface="Helvetica Light"/>
                         </a:rPr>
                         <a:t>Lab_ID</a:t>
                       </a:r>
@@ -6362,6 +6471,7 @@
                           <a:latin typeface="Helvetica Light"/>
                           <a:ea typeface="Helvetica Light"/>
                           <a:cs typeface="Helvetica Light"/>
+                          <a:sym typeface="Helvetica Light"/>
                         </a:rPr>
                         <a:t>INT</a:t>
                       </a:r>
@@ -6395,6 +6505,7 @@
                           <a:latin typeface="Helvetica Light"/>
                           <a:ea typeface="Helvetica Light"/>
                           <a:cs typeface="Helvetica Light"/>
+                          <a:sym typeface="Helvetica Light"/>
                         </a:rPr>
                         <a:t>FOREIGN KEY</a:t>
                       </a:r>
@@ -6402,6 +6513,7 @@
                         <a:latin typeface="Helvetica Light"/>
                         <a:ea typeface="Helvetica Light"/>
                         <a:cs typeface="Helvetica Light"/>
+                        <a:sym typeface="Helvetica Light"/>
                       </a:endParaRPr>
                     </a:p>
                     <a:p>
@@ -6413,6 +6525,7 @@
                           <a:latin typeface="Helvetica Light"/>
                           <a:ea typeface="Helvetica Light"/>
                           <a:cs typeface="Helvetica Light"/>
+                          <a:sym typeface="Helvetica Light"/>
                         </a:rPr>
                         <a:t>NOT NULL</a:t>
                       </a:r>
@@ -6446,6 +6559,7 @@
                           <a:latin typeface="Helvetica Light"/>
                           <a:ea typeface="Helvetica Light"/>
                           <a:cs typeface="Helvetica Light"/>
+                          <a:sym typeface="Helvetica Light"/>
                         </a:rPr>
                         <a:t>Identify the location of the PC </a:t>
                       </a:r>
@@ -6467,556 +6581,21 @@
                   </a:tcPr>
                 </a:tc>
               </a:tr>
-              <a:tr h="908078">
-                <a:tc>
-                  <a:txBody>
-                    <a:bodyPr/>
-                    <a:lstStyle/>
-                    <a:p>
-                      <a:pPr lvl="0" algn="ctr" defTabSz="914400">
-                        <a:defRPr b="0" i="0" sz="1800"/>
-                      </a:pPr>
-                      <a:r>
-                        <a:rPr sz="2600">
-                          <a:latin typeface="Helvetica Light"/>
-                          <a:ea typeface="Helvetica Light"/>
-                          <a:cs typeface="Helvetica Light"/>
-                        </a:rPr>
-                        <a:t>Monitor_ID</a:t>
-                      </a:r>
-                    </a:p>
-                  </a:txBody>
-                  <a:tcPr marL="50800" marR="50800" marT="50800" marB="50800" anchor="ctr" anchorCtr="0" horzOverflow="overflow">
-                    <a:lnL w="12700">
-                      <a:miter lim="400000"/>
-                    </a:lnL>
-                    <a:lnR w="12700">
-                      <a:miter lim="400000"/>
-                    </a:lnR>
-                    <a:lnT w="12700">
-                      <a:miter lim="400000"/>
-                    </a:lnT>
-                    <a:lnB w="12700">
-                      <a:miter lim="400000"/>
-                    </a:lnB>
-                  </a:tcPr>
-                </a:tc>
-                <a:tc>
-                  <a:txBody>
-                    <a:bodyPr/>
-                    <a:lstStyle/>
-                    <a:p>
-                      <a:pPr lvl="0" algn="ctr" defTabSz="914400">
-                        <a:defRPr b="0" i="0" sz="1800"/>
-                      </a:pPr>
-                      <a:r>
-                        <a:rPr sz="2600">
-                          <a:latin typeface="Helvetica Light"/>
-                          <a:ea typeface="Helvetica Light"/>
-                          <a:cs typeface="Helvetica Light"/>
-                        </a:rPr>
-                        <a:t>INT</a:t>
-                      </a:r>
-                    </a:p>
-                  </a:txBody>
-                  <a:tcPr marL="50800" marR="50800" marT="50800" marB="50800" anchor="ctr" anchorCtr="0" horzOverflow="overflow">
-                    <a:lnL w="12700">
-                      <a:miter lim="400000"/>
-                    </a:lnL>
-                    <a:lnR w="12700">
-                      <a:miter lim="400000"/>
-                    </a:lnR>
-                    <a:lnT w="12700">
-                      <a:miter lim="400000"/>
-                    </a:lnT>
-                    <a:lnB w="12700">
-                      <a:miter lim="400000"/>
-                    </a:lnB>
-                  </a:tcPr>
-                </a:tc>
-                <a:tc>
-                  <a:txBody>
-                    <a:bodyPr/>
-                    <a:lstStyle/>
-                    <a:p>
-                      <a:pPr lvl="0" algn="ctr" defTabSz="914400">
-                        <a:defRPr b="0" i="0" sz="1800"/>
-                      </a:pPr>
-                      <a:r>
-                        <a:rPr sz="2600">
-                          <a:latin typeface="Helvetica Light"/>
-                          <a:ea typeface="Helvetica Light"/>
-                          <a:cs typeface="Helvetica Light"/>
-                        </a:rPr>
-                        <a:t>UNIQUE</a:t>
-                      </a:r>
-                    </a:p>
-                  </a:txBody>
-                  <a:tcPr marL="50800" marR="50800" marT="50800" marB="50800" anchor="ctr" anchorCtr="0" horzOverflow="overflow">
-                    <a:lnL w="12700">
-                      <a:miter lim="400000"/>
-                    </a:lnL>
-                    <a:lnR w="12700">
-                      <a:miter lim="400000"/>
-                    </a:lnR>
-                    <a:lnT w="12700">
-                      <a:miter lim="400000"/>
-                    </a:lnT>
-                    <a:lnB w="12700">
-                      <a:miter lim="400000"/>
-                    </a:lnB>
-                  </a:tcPr>
-                </a:tc>
-                <a:tc>
-                  <a:txBody>
-                    <a:bodyPr/>
-                    <a:lstStyle/>
-                    <a:p>
-                      <a:pPr lvl="0" algn="ctr" defTabSz="914400">
-                        <a:defRPr b="0" i="0" sz="1800"/>
-                      </a:pPr>
-                      <a:r>
-                        <a:rPr sz="2600">
-                          <a:latin typeface="Helvetica Light"/>
-                          <a:ea typeface="Helvetica Light"/>
-                          <a:cs typeface="Helvetica Light"/>
-                        </a:rPr>
-                        <a:t/>
-                      </a:r>
-                    </a:p>
-                  </a:txBody>
-                  <a:tcPr marL="50800" marR="50800" marT="50800" marB="50800" anchor="ctr" anchorCtr="0" horzOverflow="overflow">
-                    <a:lnL w="12700">
-                      <a:miter lim="400000"/>
-                    </a:lnL>
-                    <a:lnR w="12700">
-                      <a:miter lim="400000"/>
-                    </a:lnR>
-                    <a:lnT w="12700">
-                      <a:miter lim="400000"/>
-                    </a:lnT>
-                    <a:lnB w="12700">
-                      <a:miter lim="400000"/>
-                    </a:lnB>
-                  </a:tcPr>
-                </a:tc>
-              </a:tr>
-              <a:tr h="764570">
-                <a:tc>
-                  <a:txBody>
-                    <a:bodyPr/>
-                    <a:lstStyle/>
-                    <a:p>
-                      <a:pPr lvl="0" algn="ctr" defTabSz="914400">
-                        <a:defRPr b="0" i="0" sz="1800"/>
-                      </a:pPr>
-                      <a:r>
-                        <a:rPr sz="2600">
-                          <a:latin typeface="Helvetica Light"/>
-                          <a:ea typeface="Helvetica Light"/>
-                          <a:cs typeface="Helvetica Light"/>
-                        </a:rPr>
-                        <a:t>CPU_ID</a:t>
-                      </a:r>
-                    </a:p>
-                  </a:txBody>
-                  <a:tcPr marL="50800" marR="50800" marT="50800" marB="50800" anchor="ctr" anchorCtr="0" horzOverflow="overflow">
-                    <a:lnL w="12700">
-                      <a:miter lim="400000"/>
-                    </a:lnL>
-                    <a:lnR w="12700">
-                      <a:miter lim="400000"/>
-                    </a:lnR>
-                    <a:lnT w="12700">
-                      <a:miter lim="400000"/>
-                    </a:lnT>
-                    <a:lnB w="12700">
-                      <a:miter lim="400000"/>
-                    </a:lnB>
-                  </a:tcPr>
-                </a:tc>
-                <a:tc>
-                  <a:txBody>
-                    <a:bodyPr/>
-                    <a:lstStyle/>
-                    <a:p>
-                      <a:pPr lvl="0" algn="ctr" defTabSz="914400">
-                        <a:defRPr b="0" i="0" sz="1800"/>
-                      </a:pPr>
-                      <a:r>
-                        <a:rPr sz="2600">
-                          <a:latin typeface="Helvetica Light"/>
-                          <a:ea typeface="Helvetica Light"/>
-                          <a:cs typeface="Helvetica Light"/>
-                        </a:rPr>
-                        <a:t>INT</a:t>
-                      </a:r>
-                    </a:p>
-                  </a:txBody>
-                  <a:tcPr marL="50800" marR="50800" marT="50800" marB="50800" anchor="ctr" anchorCtr="0" horzOverflow="overflow">
-                    <a:lnL w="12700">
-                      <a:miter lim="400000"/>
-                    </a:lnL>
-                    <a:lnR w="12700">
-                      <a:miter lim="400000"/>
-                    </a:lnR>
-                    <a:lnT w="12700">
-                      <a:miter lim="400000"/>
-                    </a:lnT>
-                    <a:lnB w="12700">
-                      <a:miter lim="400000"/>
-                    </a:lnB>
-                  </a:tcPr>
-                </a:tc>
-                <a:tc>
-                  <a:txBody>
-                    <a:bodyPr/>
-                    <a:lstStyle/>
-                    <a:p>
-                      <a:pPr lvl="0" algn="ctr" defTabSz="914400">
-                        <a:defRPr b="0" i="0" sz="1800"/>
-                      </a:pPr>
-                      <a:r>
-                        <a:rPr sz="2600">
-                          <a:latin typeface="Helvetica Light"/>
-                          <a:ea typeface="Helvetica Light"/>
-                          <a:cs typeface="Helvetica Light"/>
-                        </a:rPr>
-                        <a:t>UNIQUE</a:t>
-                      </a:r>
-                    </a:p>
-                  </a:txBody>
-                  <a:tcPr marL="50800" marR="50800" marT="50800" marB="50800" anchor="ctr" anchorCtr="0" horzOverflow="overflow">
-                    <a:lnL w="12700">
-                      <a:miter lim="400000"/>
-                    </a:lnL>
-                    <a:lnR w="12700">
-                      <a:miter lim="400000"/>
-                    </a:lnR>
-                    <a:lnT w="12700">
-                      <a:miter lim="400000"/>
-                    </a:lnT>
-                    <a:lnB w="12700">
-                      <a:miter lim="400000"/>
-                    </a:lnB>
-                  </a:tcPr>
-                </a:tc>
-                <a:tc>
-                  <a:txBody>
-                    <a:bodyPr/>
-                    <a:lstStyle/>
-                    <a:p>
-                      <a:pPr lvl="0" algn="l" defTabSz="914400">
-                        <a:defRPr b="0" i="0" sz="1800"/>
-                      </a:pPr>
-                      <a:r>
-                        <a:rPr sz="2600">
-                          <a:latin typeface="Helvetica Light"/>
-                          <a:ea typeface="Helvetica Light"/>
-                          <a:cs typeface="Helvetica Light"/>
-                        </a:rPr>
-                        <a:t/>
-                      </a:r>
-                    </a:p>
-                  </a:txBody>
-                  <a:tcPr marL="50800" marR="50800" marT="50800" marB="50800" anchor="ctr" anchorCtr="0" horzOverflow="overflow">
-                    <a:lnL w="12700">
-                      <a:miter lim="400000"/>
-                    </a:lnL>
-                    <a:lnR w="12700">
-                      <a:miter lim="400000"/>
-                    </a:lnR>
-                    <a:lnT w="12700">
-                      <a:miter lim="400000"/>
-                    </a:lnT>
-                    <a:lnB w="12700">
-                      <a:miter lim="400000"/>
-                    </a:lnB>
-                  </a:tcPr>
-                </a:tc>
-              </a:tr>
-              <a:tr h="839110">
-                <a:tc>
-                  <a:txBody>
-                    <a:bodyPr/>
-                    <a:lstStyle/>
-                    <a:p>
-                      <a:pPr lvl="0" algn="ctr" defTabSz="914400">
-                        <a:defRPr b="0" i="0" sz="1800"/>
-                      </a:pPr>
-                      <a:r>
-                        <a:rPr sz="2600">
-                          <a:latin typeface="Helvetica Light"/>
-                          <a:ea typeface="Helvetica Light"/>
-                          <a:cs typeface="Helvetica Light"/>
-                        </a:rPr>
-                        <a:t>Mouse_ID</a:t>
-                      </a:r>
-                    </a:p>
-                  </a:txBody>
-                  <a:tcPr marL="50800" marR="50800" marT="50800" marB="50800" anchor="ctr" anchorCtr="0" horzOverflow="overflow">
-                    <a:lnL w="12700">
-                      <a:miter lim="400000"/>
-                    </a:lnL>
-                    <a:lnR w="12700">
-                      <a:miter lim="400000"/>
-                    </a:lnR>
-                    <a:lnT w="12700">
-                      <a:miter lim="400000"/>
-                    </a:lnT>
-                    <a:lnB w="12700">
-                      <a:miter lim="400000"/>
-                    </a:lnB>
-                  </a:tcPr>
-                </a:tc>
-                <a:tc>
-                  <a:txBody>
-                    <a:bodyPr/>
-                    <a:lstStyle/>
-                    <a:p>
-                      <a:pPr lvl="0" algn="ctr" defTabSz="914400">
-                        <a:defRPr b="0" i="0" sz="1800"/>
-                      </a:pPr>
-                      <a:r>
-                        <a:rPr sz="2600">
-                          <a:latin typeface="Helvetica Light"/>
-                          <a:ea typeface="Helvetica Light"/>
-                          <a:cs typeface="Helvetica Light"/>
-                        </a:rPr>
-                        <a:t>INT</a:t>
-                      </a:r>
-                    </a:p>
-                  </a:txBody>
-                  <a:tcPr marL="50800" marR="50800" marT="50800" marB="50800" anchor="ctr" anchorCtr="0" horzOverflow="overflow">
-                    <a:lnL w="12700">
-                      <a:miter lim="400000"/>
-                    </a:lnL>
-                    <a:lnR w="12700">
-                      <a:miter lim="400000"/>
-                    </a:lnR>
-                    <a:lnT w="12700">
-                      <a:miter lim="400000"/>
-                    </a:lnT>
-                    <a:lnB w="12700">
-                      <a:miter lim="400000"/>
-                    </a:lnB>
-                  </a:tcPr>
-                </a:tc>
-                <a:tc>
-                  <a:txBody>
-                    <a:bodyPr/>
-                    <a:lstStyle/>
-                    <a:p>
-                      <a:pPr lvl="0" algn="ctr" defTabSz="914400">
-                        <a:defRPr b="0" i="0" sz="1800"/>
-                      </a:pPr>
-                      <a:r>
-                        <a:rPr sz="2600">
-                          <a:latin typeface="Helvetica Light"/>
-                          <a:ea typeface="Helvetica Light"/>
-                          <a:cs typeface="Helvetica Light"/>
-                        </a:rPr>
-                        <a:t>UNIQUE</a:t>
-                      </a:r>
-                    </a:p>
-                  </a:txBody>
-                  <a:tcPr marL="50800" marR="50800" marT="50800" marB="50800" anchor="ctr" anchorCtr="0" horzOverflow="overflow">
-                    <a:lnL w="12700">
-                      <a:miter lim="400000"/>
-                    </a:lnL>
-                    <a:lnR w="12700">
-                      <a:miter lim="400000"/>
-                    </a:lnR>
-                    <a:lnT w="12700">
-                      <a:miter lim="400000"/>
-                    </a:lnT>
-                    <a:lnB w="12700">
-                      <a:miter lim="400000"/>
-                    </a:lnB>
-                  </a:tcPr>
-                </a:tc>
-                <a:tc>
-                  <a:txBody>
-                    <a:bodyPr/>
-                    <a:lstStyle/>
-                    <a:p>
-                      <a:pPr lvl="0" algn="ctr" defTabSz="914400">
-                        <a:defRPr b="0" i="0" sz="1800"/>
-                      </a:pPr>
-                      <a:r>
-                        <a:rPr sz="2600">
-                          <a:latin typeface="Helvetica Light"/>
-                          <a:ea typeface="Helvetica Light"/>
-                          <a:cs typeface="Helvetica Light"/>
-                        </a:rPr>
-                        <a:t/>
-                      </a:r>
-                    </a:p>
-                  </a:txBody>
-                  <a:tcPr marL="50800" marR="50800" marT="50800" marB="50800" anchor="ctr" anchorCtr="0" horzOverflow="overflow">
-                    <a:lnL w="12700">
-                      <a:miter lim="400000"/>
-                    </a:lnL>
-                    <a:lnR w="12700">
-                      <a:miter lim="400000"/>
-                    </a:lnR>
-                    <a:lnT w="12700">
-                      <a:miter lim="400000"/>
-                    </a:lnT>
-                    <a:lnB w="12700">
-                      <a:miter lim="400000"/>
-                    </a:lnB>
-                  </a:tcPr>
-                </a:tc>
-              </a:tr>
-              <a:tr h="739083">
-                <a:tc>
-                  <a:txBody>
-                    <a:bodyPr/>
-                    <a:lstStyle/>
-                    <a:p>
-                      <a:pPr lvl="0" algn="ctr" defTabSz="914400">
-                        <a:defRPr b="0" i="0" sz="1800"/>
-                      </a:pPr>
-                      <a:r>
-                        <a:rPr sz="2600">
-                          <a:latin typeface="Helvetica Light"/>
-                          <a:ea typeface="Helvetica Light"/>
-                          <a:cs typeface="Helvetica Light"/>
-                        </a:rPr>
-                        <a:t>Keyboard_ID</a:t>
-                      </a:r>
-                    </a:p>
-                  </a:txBody>
-                  <a:tcPr marL="50800" marR="50800" marT="50800" marB="50800" anchor="ctr" anchorCtr="0" horzOverflow="overflow">
-                    <a:lnL w="12700">
-                      <a:miter lim="400000"/>
-                    </a:lnL>
-                    <a:lnR w="12700">
-                      <a:miter lim="400000"/>
-                    </a:lnR>
-                    <a:lnT w="12700">
-                      <a:miter lim="400000"/>
-                    </a:lnT>
-                    <a:lnB w="12700">
-                      <a:miter lim="400000"/>
-                    </a:lnB>
-                  </a:tcPr>
-                </a:tc>
-                <a:tc>
-                  <a:txBody>
-                    <a:bodyPr/>
-                    <a:lstStyle/>
-                    <a:p>
-                      <a:pPr lvl="0" algn="ctr" defTabSz="914400">
-                        <a:defRPr b="0" i="0" sz="1800"/>
-                      </a:pPr>
-                      <a:r>
-                        <a:rPr sz="2600">
-                          <a:latin typeface="Helvetica Light"/>
-                          <a:ea typeface="Helvetica Light"/>
-                          <a:cs typeface="Helvetica Light"/>
-                        </a:rPr>
-                        <a:t>INT</a:t>
-                      </a:r>
-                    </a:p>
-                  </a:txBody>
-                  <a:tcPr marL="50800" marR="50800" marT="50800" marB="50800" anchor="ctr" anchorCtr="0" horzOverflow="overflow">
-                    <a:lnL w="12700">
-                      <a:miter lim="400000"/>
-                    </a:lnL>
-                    <a:lnR w="12700">
-                      <a:miter lim="400000"/>
-                    </a:lnR>
-                    <a:lnT w="12700">
-                      <a:miter lim="400000"/>
-                    </a:lnT>
-                    <a:lnB w="12700">
-                      <a:miter lim="400000"/>
-                    </a:lnB>
-                  </a:tcPr>
-                </a:tc>
-                <a:tc>
-                  <a:txBody>
-                    <a:bodyPr/>
-                    <a:lstStyle/>
-                    <a:p>
-                      <a:pPr lvl="0" algn="ctr" defTabSz="914400">
-                        <a:defRPr b="0" i="0" sz="1800"/>
-                      </a:pPr>
-                      <a:r>
-                        <a:rPr sz="2600">
-                          <a:latin typeface="Helvetica Light"/>
-                          <a:ea typeface="Helvetica Light"/>
-                          <a:cs typeface="Helvetica Light"/>
-                        </a:rPr>
-                        <a:t>UNIQUE</a:t>
-                      </a:r>
-                    </a:p>
-                  </a:txBody>
-                  <a:tcPr marL="50800" marR="50800" marT="50800" marB="50800" anchor="ctr" anchorCtr="0" horzOverflow="overflow">
-                    <a:lnL w="12700">
-                      <a:miter lim="400000"/>
-                    </a:lnL>
-                    <a:lnR w="12700">
-                      <a:miter lim="400000"/>
-                    </a:lnR>
-                    <a:lnT w="12700">
-                      <a:miter lim="400000"/>
-                    </a:lnT>
-                    <a:lnB w="12700">
-                      <a:miter lim="400000"/>
-                    </a:lnB>
-                  </a:tcPr>
-                </a:tc>
-                <a:tc>
-                  <a:txBody>
-                    <a:bodyPr/>
-                    <a:lstStyle/>
-                    <a:p>
-                      <a:pPr lvl="0" algn="ctr" defTabSz="914400">
-                        <a:defRPr b="0" i="0" sz="1800"/>
-                      </a:pPr>
-                      <a:r>
-                        <a:rPr sz="2600">
-                          <a:latin typeface="Helvetica Light"/>
-                          <a:ea typeface="Helvetica Light"/>
-                          <a:cs typeface="Helvetica Light"/>
-                        </a:rPr>
-                        <a:t/>
-                      </a:r>
-                    </a:p>
-                  </a:txBody>
-                  <a:tcPr marL="50800" marR="50800" marT="50800" marB="50800" anchor="ctr" anchorCtr="0" horzOverflow="overflow">
-                    <a:lnL w="12700">
-                      <a:miter lim="400000"/>
-                    </a:lnL>
-                    <a:lnR w="12700">
-                      <a:miter lim="400000"/>
-                    </a:lnR>
-                    <a:lnT w="12700">
-                      <a:miter lim="400000"/>
-                    </a:lnT>
-                    <a:lnB w="12700">
-                      <a:miter lim="400000"/>
-                    </a:lnB>
-                  </a:tcPr>
-                </a:tc>
-              </a:tr>
-              <a:tr h="889000">
-                <a:tc>
-                  <a:txBody>
-                    <a:bodyPr/>
-                    <a:lstStyle/>
-                    <a:p>
-                      <a:pPr lvl="0" algn="ctr" defTabSz="914400">
-                        <a:defRPr b="0" i="0" sz="1800"/>
-                      </a:pPr>
-                      <a:r>
-                        <a:rPr sz="2600">
-                          <a:latin typeface="Helvetica Light"/>
-                          <a:ea typeface="Helvetica Light"/>
-                          <a:cs typeface="Helvetica Light"/>
+              <a:tr h="1272483">
+                <a:tc>
+                  <a:txBody>
+                    <a:bodyPr/>
+                    <a:lstStyle/>
+                    <a:p>
+                      <a:pPr lvl="0" algn="ctr" defTabSz="914400">
+                        <a:defRPr b="0" i="0" sz="1800"/>
+                      </a:pPr>
+                      <a:r>
+                        <a:rPr sz="2600">
+                          <a:latin typeface="Helvetica Light"/>
+                          <a:ea typeface="Helvetica Light"/>
+                          <a:cs typeface="Helvetica Light"/>
+                          <a:sym typeface="Helvetica Light"/>
                         </a:rPr>
                         <a:t>OS</a:t>
                       </a:r>
@@ -7050,6 +6629,7 @@
                           <a:latin typeface="Helvetica Light"/>
                           <a:ea typeface="Helvetica Light"/>
                           <a:cs typeface="Helvetica Light"/>
+                          <a:sym typeface="Helvetica Light"/>
                         </a:rPr>
                         <a:t>varchar(20)</a:t>
                       </a:r>
@@ -7083,6 +6663,7 @@
                           <a:latin typeface="Helvetica Light"/>
                           <a:ea typeface="Helvetica Light"/>
                           <a:cs typeface="Helvetica Light"/>
+                          <a:sym typeface="Helvetica Light"/>
                         </a:rPr>
                         <a:t>NOT NULL</a:t>
                       </a:r>
@@ -7116,6 +6697,7 @@
                           <a:latin typeface="Helvetica Light"/>
                           <a:ea typeface="Helvetica Light"/>
                           <a:cs typeface="Helvetica Light"/>
+                          <a:sym typeface="Helvetica Light"/>
                         </a:rPr>
                         <a:t>Operating System installed on the computer</a:t>
                       </a:r>
@@ -7177,8 +6759,8 @@
         </p:nvSpPr>
         <p:spPr>
           <a:xfrm>
-            <a:off x="396356" y="119247"/>
-            <a:ext cx="12212088" cy="9373627"/>
+            <a:off x="396356" y="119246"/>
+            <a:ext cx="12212088" cy="9373629"/>
           </a:xfrm>
           <a:prstGeom prst="rect">
             <a:avLst/>
@@ -7216,7 +6798,7 @@
         </p:nvGraphicFramePr>
         <p:xfrm>
           <a:off x="673539" y="1494651"/>
-          <a:ext cx="11874840" cy="7817678"/>
+          <a:ext cx="11874842" cy="7817678"/>
         </p:xfrm>
         <a:graphic xmlns:a="http://schemas.openxmlformats.org/drawingml/2006/main">
           <a:graphicData uri="http://schemas.openxmlformats.org/drawingml/2006/table">
@@ -7261,6 +6843,7 @@
                           <a:latin typeface="Helvetica Light"/>
                           <a:ea typeface="Helvetica Light"/>
                           <a:cs typeface="Helvetica Light"/>
+                          <a:sym typeface="Helvetica Light"/>
                         </a:rPr>
                         <a:t>Name</a:t>
                       </a:r>
@@ -7314,6 +6897,7 @@
                           <a:latin typeface="Helvetica Light"/>
                           <a:ea typeface="Helvetica Light"/>
                           <a:cs typeface="Helvetica Light"/>
+                          <a:sym typeface="Helvetica Light"/>
                         </a:rPr>
                         <a:t>Data Type</a:t>
                       </a:r>
@@ -7367,6 +6951,7 @@
                           <a:latin typeface="Helvetica Light"/>
                           <a:ea typeface="Helvetica Light"/>
                           <a:cs typeface="Helvetica Light"/>
+                          <a:sym typeface="Helvetica Light"/>
                         </a:rPr>
                         <a:t>Constraints</a:t>
                       </a:r>
@@ -7420,6 +7005,7 @@
                           <a:latin typeface="Helvetica Light"/>
                           <a:ea typeface="Helvetica Light"/>
                           <a:cs typeface="Helvetica Light"/>
+                          <a:sym typeface="Helvetica Light"/>
                         </a:rPr>
                         <a:t>Details</a:t>
                       </a:r>
@@ -7458,6 +7044,7 @@
                           <a:latin typeface="Helvetica Light"/>
                           <a:ea typeface="Helvetica Light"/>
                           <a:cs typeface="Helvetica Light"/>
+                          <a:sym typeface="Helvetica Light"/>
                         </a:rPr>
                         <a:t>Component_ID</a:t>
                       </a:r>
@@ -7491,6 +7078,7 @@
                           <a:latin typeface="Helvetica Light"/>
                           <a:ea typeface="Helvetica Light"/>
                           <a:cs typeface="Helvetica Light"/>
+                          <a:sym typeface="Helvetica Light"/>
                         </a:rPr>
                         <a:t>INT</a:t>
                       </a:r>
@@ -7524,6 +7112,7 @@
                           <a:latin typeface="Helvetica Light"/>
                           <a:ea typeface="Helvetica Light"/>
                           <a:cs typeface="Helvetica Light"/>
+                          <a:sym typeface="Helvetica Light"/>
                         </a:rPr>
                         <a:t>NOT NULL</a:t>
                       </a:r>
@@ -7531,6 +7120,7 @@
                         <a:latin typeface="Helvetica Light"/>
                         <a:ea typeface="Helvetica Light"/>
                         <a:cs typeface="Helvetica Light"/>
+                        <a:sym typeface="Helvetica Light"/>
                       </a:endParaRPr>
                     </a:p>
                     <a:p>
@@ -7542,6 +7132,7 @@
                           <a:latin typeface="Helvetica Light"/>
                           <a:ea typeface="Helvetica Light"/>
                           <a:cs typeface="Helvetica Light"/>
+                          <a:sym typeface="Helvetica Light"/>
                         </a:rPr>
                         <a:t>UNIQUE</a:t>
                       </a:r>
@@ -7575,6 +7166,7 @@
                           <a:latin typeface="Helvetica Light"/>
                           <a:ea typeface="Helvetica Light"/>
                           <a:cs typeface="Helvetica Light"/>
+                          <a:sym typeface="Helvetica Light"/>
                         </a:rPr>
                         <a:t>Uniquely Identify each component</a:t>
                       </a:r>
@@ -7610,6 +7202,7 @@
                           <a:latin typeface="Helvetica Light"/>
                           <a:ea typeface="Helvetica Light"/>
                           <a:cs typeface="Helvetica Light"/>
+                          <a:sym typeface="Helvetica Light"/>
                         </a:rPr>
                         <a:t>Date_of_purchase</a:t>
                       </a:r>
@@ -7643,6 +7236,7 @@
                           <a:latin typeface="Helvetica Light"/>
                           <a:ea typeface="Helvetica Light"/>
                           <a:cs typeface="Helvetica Light"/>
+                          <a:sym typeface="Helvetica Light"/>
                         </a:rPr>
                         <a:t>DATE</a:t>
                       </a:r>
@@ -7676,6 +7270,7 @@
                           <a:latin typeface="Helvetica Light"/>
                           <a:ea typeface="Helvetica Light"/>
                           <a:cs typeface="Helvetica Light"/>
+                          <a:sym typeface="Helvetica Light"/>
                         </a:rPr>
                         <a:t>NOT NULL</a:t>
                       </a:r>
@@ -7709,6 +7304,7 @@
                           <a:latin typeface="Helvetica Light"/>
                           <a:ea typeface="Helvetica Light"/>
                           <a:cs typeface="Helvetica Light"/>
+                          <a:sym typeface="Helvetica Light"/>
                         </a:rPr>
                         <a:t>date of purchase of the component</a:t>
                       </a:r>
@@ -7744,6 +7340,7 @@
                           <a:latin typeface="Helvetica Light"/>
                           <a:ea typeface="Helvetica Light"/>
                           <a:cs typeface="Helvetica Light"/>
+                          <a:sym typeface="Helvetica Light"/>
                         </a:rPr>
                         <a:t>Working_Status</a:t>
                       </a:r>
@@ -7777,6 +7374,7 @@
                           <a:latin typeface="Helvetica Light"/>
                           <a:ea typeface="Helvetica Light"/>
                           <a:cs typeface="Helvetica Light"/>
+                          <a:sym typeface="Helvetica Light"/>
                         </a:rPr>
                         <a:t>BOOLEAN</a:t>
                       </a:r>
@@ -7810,6 +7408,7 @@
                           <a:latin typeface="Helvetica Light"/>
                           <a:ea typeface="Helvetica Light"/>
                           <a:cs typeface="Helvetica Light"/>
+                          <a:sym typeface="Helvetica Light"/>
                         </a:rPr>
                         <a:t>NOT NULL</a:t>
                       </a:r>
@@ -7843,6 +7442,7 @@
                           <a:latin typeface="Helvetica Light"/>
                           <a:ea typeface="Helvetica Light"/>
                           <a:cs typeface="Helvetica Light"/>
+                          <a:sym typeface="Helvetica Light"/>
                         </a:rPr>
                         <a:t>1 - working</a:t>
                       </a:r>
@@ -7850,6 +7450,7 @@
                         <a:latin typeface="Helvetica Light"/>
                         <a:ea typeface="Helvetica Light"/>
                         <a:cs typeface="Helvetica Light"/>
+                        <a:sym typeface="Helvetica Light"/>
                       </a:endParaRPr>
                     </a:p>
                     <a:p>
@@ -7861,6 +7462,7 @@
                           <a:latin typeface="Helvetica Light"/>
                           <a:ea typeface="Helvetica Light"/>
                           <a:cs typeface="Helvetica Light"/>
+                          <a:sym typeface="Helvetica Light"/>
                         </a:rPr>
                         <a:t>0 - not working</a:t>
                       </a:r>
@@ -7896,6 +7498,7 @@
                           <a:latin typeface="Helvetica Light"/>
                           <a:ea typeface="Helvetica Light"/>
                           <a:cs typeface="Helvetica Light"/>
+                          <a:sym typeface="Helvetica Light"/>
                         </a:rPr>
                         <a:t>Warranty</a:t>
                       </a:r>
@@ -7929,6 +7532,7 @@
                           <a:latin typeface="Helvetica Light"/>
                           <a:ea typeface="Helvetica Light"/>
                           <a:cs typeface="Helvetica Light"/>
+                          <a:sym typeface="Helvetica Light"/>
                         </a:rPr>
                         <a:t>INT</a:t>
                       </a:r>
@@ -7962,6 +7566,7 @@
                           <a:latin typeface="Helvetica Light"/>
                           <a:ea typeface="Helvetica Light"/>
                           <a:cs typeface="Helvetica Light"/>
+                          <a:sym typeface="Helvetica Light"/>
                         </a:rPr>
                         <a:t>POSITIVE</a:t>
                       </a:r>
@@ -7995,6 +7600,7 @@
                           <a:latin typeface="Helvetica Light"/>
                           <a:ea typeface="Helvetica Light"/>
                           <a:cs typeface="Helvetica Light"/>
+                          <a:sym typeface="Helvetica Light"/>
                         </a:rPr>
                         <a:t>no of months of warrant </a:t>
                       </a:r>
@@ -8030,6 +7636,7 @@
                           <a:latin typeface="Helvetica Light"/>
                           <a:ea typeface="Helvetica Light"/>
                           <a:cs typeface="Helvetica Light"/>
+                          <a:sym typeface="Helvetica Light"/>
                         </a:rPr>
                         <a:t>Supplier_ID</a:t>
                       </a:r>
@@ -8063,6 +7670,7 @@
                           <a:latin typeface="Helvetica Light"/>
                           <a:ea typeface="Helvetica Light"/>
                           <a:cs typeface="Helvetica Light"/>
+                          <a:sym typeface="Helvetica Light"/>
                         </a:rPr>
                         <a:t>INT</a:t>
                       </a:r>
@@ -8096,6 +7704,7 @@
                           <a:latin typeface="Helvetica Light"/>
                           <a:ea typeface="Helvetica Light"/>
                           <a:cs typeface="Helvetica Light"/>
+                          <a:sym typeface="Helvetica Light"/>
                         </a:rPr>
                         <a:t>NOT NULL</a:t>
                       </a:r>
@@ -8129,6 +7738,7 @@
                           <a:latin typeface="Helvetica Light"/>
                           <a:ea typeface="Helvetica Light"/>
                           <a:cs typeface="Helvetica Light"/>
+                          <a:sym typeface="Helvetica Light"/>
                         </a:rPr>
                         <a:t>indicating the supplier of the component</a:t>
                       </a:r>
@@ -8164,6 +7774,7 @@
                           <a:latin typeface="Helvetica Light"/>
                           <a:ea typeface="Helvetica Light"/>
                           <a:cs typeface="Helvetica Light"/>
+                          <a:sym typeface="Helvetica Light"/>
                         </a:rPr>
                         <a:t>Type</a:t>
                       </a:r>
@@ -8197,6 +7808,7 @@
                           <a:latin typeface="Helvetica Light"/>
                           <a:ea typeface="Helvetica Light"/>
                           <a:cs typeface="Helvetica Light"/>
+                          <a:sym typeface="Helvetica Light"/>
                         </a:rPr>
                         <a:t>INT</a:t>
                       </a:r>
@@ -8230,6 +7842,7 @@
                           <a:latin typeface="Helvetica Light"/>
                           <a:ea typeface="Helvetica Light"/>
                           <a:cs typeface="Helvetica Light"/>
+                          <a:sym typeface="Helvetica Light"/>
                         </a:rPr>
                         <a:t>NOT NULL</a:t>
                       </a:r>
@@ -8263,6 +7876,7 @@
                           <a:latin typeface="Helvetica Light"/>
                           <a:ea typeface="Helvetica Light"/>
                           <a:cs typeface="Helvetica Light"/>
+                          <a:sym typeface="Helvetica Light"/>
                         </a:rPr>
                         <a:t>1 - CPU</a:t>
                       </a:r>
@@ -8270,6 +7884,7 @@
                         <a:latin typeface="Helvetica Light"/>
                         <a:ea typeface="Helvetica Light"/>
                         <a:cs typeface="Helvetica Light"/>
+                        <a:sym typeface="Helvetica Light"/>
                       </a:endParaRPr>
                     </a:p>
                     <a:p>
@@ -8281,6 +7896,7 @@
                           <a:latin typeface="Helvetica Light"/>
                           <a:ea typeface="Helvetica Light"/>
                           <a:cs typeface="Helvetica Light"/>
+                          <a:sym typeface="Helvetica Light"/>
                         </a:rPr>
                         <a:t>2 - Monitor</a:t>
                       </a:r>
@@ -8288,6 +7904,7 @@
                         <a:latin typeface="Helvetica Light"/>
                         <a:ea typeface="Helvetica Light"/>
                         <a:cs typeface="Helvetica Light"/>
+                        <a:sym typeface="Helvetica Light"/>
                       </a:endParaRPr>
                     </a:p>
                     <a:p>
@@ -8299,6 +7916,7 @@
                           <a:latin typeface="Helvetica Light"/>
                           <a:ea typeface="Helvetica Light"/>
                           <a:cs typeface="Helvetica Light"/>
+                          <a:sym typeface="Helvetica Light"/>
                         </a:rPr>
                         <a:t>3 - Keyboard</a:t>
                       </a:r>
@@ -8306,6 +7924,7 @@
                         <a:latin typeface="Helvetica Light"/>
                         <a:ea typeface="Helvetica Light"/>
                         <a:cs typeface="Helvetica Light"/>
+                        <a:sym typeface="Helvetica Light"/>
                       </a:endParaRPr>
                     </a:p>
                     <a:p>
@@ -8317,6 +7936,7 @@
                           <a:latin typeface="Helvetica Light"/>
                           <a:ea typeface="Helvetica Light"/>
                           <a:cs typeface="Helvetica Light"/>
+                          <a:sym typeface="Helvetica Light"/>
                         </a:rPr>
                         <a:t>4 - Mouse</a:t>
                       </a:r>
@@ -8324,6 +7944,7 @@
                         <a:latin typeface="Helvetica Light"/>
                         <a:ea typeface="Helvetica Light"/>
                         <a:cs typeface="Helvetica Light"/>
+                        <a:sym typeface="Helvetica Light"/>
                       </a:endParaRPr>
                     </a:p>
                     <a:p>
@@ -8335,24 +7956,10 @@
                           <a:latin typeface="Helvetica Light"/>
                           <a:ea typeface="Helvetica Light"/>
                           <a:cs typeface="Helvetica Light"/>
+                          <a:sym typeface="Helvetica Light"/>
                         </a:rPr>
                         <a:t>5- Software</a:t>
                       </a:r>
-                      <a:endParaRPr sz="2600">
-                        <a:latin typeface="Helvetica Light"/>
-                        <a:ea typeface="Helvetica Light"/>
-                        <a:cs typeface="Helvetica Light"/>
-                      </a:endParaRPr>
-                    </a:p>
-                    <a:p>
-                      <a:pPr lvl="0" algn="l" defTabSz="914400">
-                        <a:defRPr b="0" i="0" sz="1800"/>
-                      </a:pPr>
-                      <a:endParaRPr sz="2600">
-                        <a:latin typeface="Helvetica Light"/>
-                        <a:ea typeface="Helvetica Light"/>
-                        <a:cs typeface="Helvetica Light"/>
-                      </a:endParaRPr>
                     </a:p>
                   </a:txBody>
                   <a:tcPr marL="50800" marR="50800" marT="50800" marB="50800" anchor="ctr" anchorCtr="0" horzOverflow="overflow">
@@ -8411,8 +8018,8 @@
         </p:nvSpPr>
         <p:spPr>
           <a:xfrm>
-            <a:off x="396356" y="119247"/>
-            <a:ext cx="12212088" cy="9373627"/>
+            <a:off x="396356" y="119246"/>
+            <a:ext cx="12212088" cy="9373629"/>
           </a:xfrm>
           <a:prstGeom prst="rect">
             <a:avLst/>
@@ -8450,7 +8057,7 @@
         </p:nvGraphicFramePr>
         <p:xfrm>
           <a:off x="673539" y="1494650"/>
-          <a:ext cx="11874840" cy="7392091"/>
+          <a:ext cx="11874842" cy="7392091"/>
         </p:xfrm>
         <a:graphic xmlns:a="http://schemas.openxmlformats.org/drawingml/2006/main">
           <a:graphicData uri="http://schemas.openxmlformats.org/drawingml/2006/table">
@@ -8495,6 +8102,7 @@
                           <a:latin typeface="Helvetica Light"/>
                           <a:ea typeface="Helvetica Light"/>
                           <a:cs typeface="Helvetica Light"/>
+                          <a:sym typeface="Helvetica Light"/>
                         </a:rPr>
                         <a:t>Name</a:t>
                       </a:r>
@@ -8548,6 +8156,7 @@
                           <a:latin typeface="Helvetica Light"/>
                           <a:ea typeface="Helvetica Light"/>
                           <a:cs typeface="Helvetica Light"/>
+                          <a:sym typeface="Helvetica Light"/>
                         </a:rPr>
                         <a:t>Data Type</a:t>
                       </a:r>
@@ -8601,6 +8210,7 @@
                           <a:latin typeface="Helvetica Light"/>
                           <a:ea typeface="Helvetica Light"/>
                           <a:cs typeface="Helvetica Light"/>
+                          <a:sym typeface="Helvetica Light"/>
                         </a:rPr>
                         <a:t>Constraints</a:t>
                       </a:r>
@@ -8654,6 +8264,7 @@
                           <a:latin typeface="Helvetica Light"/>
                           <a:ea typeface="Helvetica Light"/>
                           <a:cs typeface="Helvetica Light"/>
+                          <a:sym typeface="Helvetica Light"/>
                         </a:rPr>
                         <a:t>Details</a:t>
                       </a:r>
@@ -8692,6 +8303,7 @@
                           <a:latin typeface="Helvetica Light"/>
                           <a:ea typeface="Helvetica Light"/>
                           <a:cs typeface="Helvetica Light"/>
+                          <a:sym typeface="Helvetica Light"/>
                         </a:rPr>
                         <a:t>Supplier_ID</a:t>
                       </a:r>
@@ -8725,6 +8337,7 @@
                           <a:latin typeface="Helvetica Light"/>
                           <a:ea typeface="Helvetica Light"/>
                           <a:cs typeface="Helvetica Light"/>
+                          <a:sym typeface="Helvetica Light"/>
                         </a:rPr>
                         <a:t>INT</a:t>
                       </a:r>
@@ -8758,6 +8371,7 @@
                           <a:latin typeface="Helvetica Light"/>
                           <a:ea typeface="Helvetica Light"/>
                           <a:cs typeface="Helvetica Light"/>
+                          <a:sym typeface="Helvetica Light"/>
                         </a:rPr>
                         <a:t>NOT NULL</a:t>
                       </a:r>
@@ -8765,6 +8379,7 @@
                         <a:latin typeface="Helvetica Light"/>
                         <a:ea typeface="Helvetica Light"/>
                         <a:cs typeface="Helvetica Light"/>
+                        <a:sym typeface="Helvetica Light"/>
                       </a:endParaRPr>
                     </a:p>
                     <a:p>
@@ -8776,6 +8391,7 @@
                           <a:latin typeface="Helvetica Light"/>
                           <a:ea typeface="Helvetica Light"/>
                           <a:cs typeface="Helvetica Light"/>
+                          <a:sym typeface="Helvetica Light"/>
                         </a:rPr>
                         <a:t>UNIQUE</a:t>
                       </a:r>
@@ -8809,6 +8425,7 @@
                           <a:latin typeface="Helvetica Light"/>
                           <a:ea typeface="Helvetica Light"/>
                           <a:cs typeface="Helvetica Light"/>
+                          <a:sym typeface="Helvetica Light"/>
                         </a:rPr>
                         <a:t>Uniquely Identify each supplier</a:t>
                       </a:r>
@@ -8844,6 +8461,7 @@
                           <a:latin typeface="Helvetica Light"/>
                           <a:ea typeface="Helvetica Light"/>
                           <a:cs typeface="Helvetica Light"/>
+                          <a:sym typeface="Helvetica Light"/>
                         </a:rPr>
                         <a:t>Name</a:t>
                       </a:r>
@@ -8877,6 +8495,7 @@
                           <a:latin typeface="Helvetica Light"/>
                           <a:ea typeface="Helvetica Light"/>
                           <a:cs typeface="Helvetica Light"/>
+                          <a:sym typeface="Helvetica Light"/>
                         </a:rPr>
                         <a:t>varchar(100)</a:t>
                       </a:r>
@@ -8910,6 +8529,7 @@
                           <a:latin typeface="Helvetica Light"/>
                           <a:ea typeface="Helvetica Light"/>
                           <a:cs typeface="Helvetica Light"/>
+                          <a:sym typeface="Helvetica Light"/>
                         </a:rPr>
                         <a:t>NOT NULL</a:t>
                       </a:r>
@@ -8943,6 +8563,7 @@
                           <a:latin typeface="Helvetica Light"/>
                           <a:ea typeface="Helvetica Light"/>
                           <a:cs typeface="Helvetica Light"/>
+                          <a:sym typeface="Helvetica Light"/>
                         </a:rPr>
                         <a:t>Name of the supplier</a:t>
                       </a:r>
@@ -8978,6 +8599,7 @@
                           <a:latin typeface="Helvetica Light"/>
                           <a:ea typeface="Helvetica Light"/>
                           <a:cs typeface="Helvetica Light"/>
+                          <a:sym typeface="Helvetica Light"/>
                         </a:rPr>
                         <a:t>No_of_components_supplied</a:t>
                       </a:r>
@@ -9011,6 +8633,7 @@
                           <a:latin typeface="Helvetica Light"/>
                           <a:ea typeface="Helvetica Light"/>
                           <a:cs typeface="Helvetica Light"/>
+                          <a:sym typeface="Helvetica Light"/>
                         </a:rPr>
                         <a:t>INT</a:t>
                       </a:r>
@@ -9044,6 +8667,7 @@
                           <a:latin typeface="Helvetica Light"/>
                           <a:ea typeface="Helvetica Light"/>
                           <a:cs typeface="Helvetica Light"/>
+                          <a:sym typeface="Helvetica Light"/>
                         </a:rPr>
                         <a:t>NOT NULL</a:t>
                       </a:r>
@@ -9077,6 +8701,7 @@
                           <a:latin typeface="Helvetica Light"/>
                           <a:ea typeface="Helvetica Light"/>
                           <a:cs typeface="Helvetica Light"/>
+                          <a:sym typeface="Helvetica Light"/>
                         </a:rPr>
                         <a:t>no of components supplied by that supplier</a:t>
                       </a:r>
@@ -9112,6 +8737,7 @@
                           <a:latin typeface="Helvetica Light"/>
                           <a:ea typeface="Helvetica Light"/>
                           <a:cs typeface="Helvetica Light"/>
+                          <a:sym typeface="Helvetica Light"/>
                         </a:rPr>
                         <a:t>No_of_complaints</a:t>
                       </a:r>
@@ -9145,6 +8771,7 @@
                           <a:latin typeface="Helvetica Light"/>
                           <a:ea typeface="Helvetica Light"/>
                           <a:cs typeface="Helvetica Light"/>
+                          <a:sym typeface="Helvetica Light"/>
                         </a:rPr>
                         <a:t>INT</a:t>
                       </a:r>
@@ -9178,6 +8805,7 @@
                           <a:latin typeface="Helvetica Light"/>
                           <a:ea typeface="Helvetica Light"/>
                           <a:cs typeface="Helvetica Light"/>
+                          <a:sym typeface="Helvetica Light"/>
                         </a:rPr>
                         <a:t>NON NEGATIVE</a:t>
                       </a:r>
@@ -9214,14 +8842,10 @@
                           <a:latin typeface="Helvetica Light"/>
                           <a:ea typeface="Helvetica Light"/>
                           <a:cs typeface="Helvetica Light"/>
+                          <a:sym typeface="Helvetica Light"/>
                         </a:rPr>
                         <a:t>Total complaints from the components shipped by the supplier. This can be used to track the quality of the products shipped by the supplier. </a:t>
                       </a:r>
-                      <a:endParaRPr sz="2600">
-                        <a:latin typeface="Helvetica Light"/>
-                        <a:ea typeface="Helvetica Light"/>
-                        <a:cs typeface="Helvetica Light"/>
-                      </a:endParaRPr>
                     </a:p>
                   </a:txBody>
                   <a:tcPr marL="50800" marR="50800" marT="50800" marB="50800" anchor="ctr" anchorCtr="0" horzOverflow="overflow">
@@ -9309,8 +8933,8 @@
         </p:nvSpPr>
         <p:spPr>
           <a:xfrm>
-            <a:off x="1768022" y="4203699"/>
-            <a:ext cx="9468757" cy="3378201"/>
+            <a:off x="1768021" y="4203696"/>
+            <a:ext cx="9468758" cy="3378201"/>
           </a:xfrm>
           <a:prstGeom prst="rect">
             <a:avLst/>
@@ -9334,67 +8958,127 @@
               <a:defRPr sz="1800"/>
             </a:pPr>
             <a:r>
-              <a:rPr sz="3600"/>
+              <a:rPr sz="3600">
+                <a:latin typeface="Helvetica Light"/>
+                <a:ea typeface="Helvetica Light"/>
+                <a:cs typeface="Helvetica Light"/>
+                <a:sym typeface="Helvetica Light"/>
+              </a:rPr>
               <a:t>Group Members</a:t>
             </a:r>
-            <a:endParaRPr sz="3600"/>
+            <a:endParaRPr>
+              <a:latin typeface="Helvetica Light"/>
+              <a:ea typeface="Helvetica Light"/>
+              <a:cs typeface="Helvetica Light"/>
+              <a:sym typeface="Helvetica Light"/>
+            </a:endParaRPr>
           </a:p>
           <a:p>
-            <a:pPr lvl="0" marL="360947" indent="-360947" algn="l">
+            <a:pPr lvl="0" marL="2887576" indent="-2887576" algn="l">
               <a:buSzPct val="100000"/>
+              <a:buFont typeface="Helvetica Light"/>
               <a:buChar char="•"/>
               <a:defRPr sz="1800"/>
             </a:pPr>
             <a:r>
-              <a:rPr sz="3600"/>
+              <a:rPr sz="3600">
+                <a:latin typeface="Helvetica Light"/>
+                <a:ea typeface="Helvetica Light"/>
+                <a:cs typeface="Helvetica Light"/>
+                <a:sym typeface="Helvetica Light"/>
+              </a:rPr>
               <a:t>Vaibhav Savla</a:t>
             </a:r>
-            <a:endParaRPr sz="3600"/>
+            <a:endParaRPr>
+              <a:latin typeface="Helvetica Light"/>
+              <a:ea typeface="Helvetica Light"/>
+              <a:cs typeface="Helvetica Light"/>
+              <a:sym typeface="Helvetica Light"/>
+            </a:endParaRPr>
           </a:p>
           <a:p>
-            <a:pPr lvl="0" marL="360947" indent="-360947" algn="l">
+            <a:pPr lvl="0" marL="2887576" indent="-2887576" algn="l">
               <a:buSzPct val="100000"/>
+              <a:buFont typeface="Helvetica Light"/>
               <a:buChar char="•"/>
               <a:defRPr sz="1800"/>
             </a:pPr>
             <a:r>
-              <a:rPr sz="3600"/>
+              <a:rPr sz="3600">
+                <a:latin typeface="Helvetica Light"/>
+                <a:ea typeface="Helvetica Light"/>
+                <a:cs typeface="Helvetica Light"/>
+                <a:sym typeface="Helvetica Light"/>
+              </a:rPr>
               <a:t>Sanket Kasar</a:t>
             </a:r>
-            <a:endParaRPr sz="3600"/>
+            <a:endParaRPr>
+              <a:latin typeface="Helvetica Light"/>
+              <a:ea typeface="Helvetica Light"/>
+              <a:cs typeface="Helvetica Light"/>
+              <a:sym typeface="Helvetica Light"/>
+            </a:endParaRPr>
           </a:p>
           <a:p>
-            <a:pPr lvl="0" marL="360947" indent="-360947" algn="l">
+            <a:pPr lvl="0" marL="2887576" indent="-2887576" algn="l">
               <a:buSzPct val="100000"/>
+              <a:buFont typeface="Helvetica Light"/>
               <a:buChar char="•"/>
               <a:defRPr sz="1800"/>
             </a:pPr>
             <a:r>
-              <a:rPr sz="3600"/>
+              <a:rPr sz="3600">
+                <a:latin typeface="Helvetica Light"/>
+                <a:ea typeface="Helvetica Light"/>
+                <a:cs typeface="Helvetica Light"/>
+                <a:sym typeface="Helvetica Light"/>
+              </a:rPr>
               <a:t>Omkar Mate</a:t>
             </a:r>
-            <a:endParaRPr sz="3600"/>
+            <a:endParaRPr>
+              <a:latin typeface="Helvetica Light"/>
+              <a:ea typeface="Helvetica Light"/>
+              <a:cs typeface="Helvetica Light"/>
+              <a:sym typeface="Helvetica Light"/>
+            </a:endParaRPr>
           </a:p>
           <a:p>
-            <a:pPr lvl="0" marL="360947" indent="-360947" algn="l">
+            <a:pPr lvl="0" marL="2887576" indent="-2887576" algn="l">
               <a:buSzPct val="100000"/>
+              <a:buFont typeface="Helvetica Light"/>
               <a:buChar char="•"/>
               <a:defRPr sz="1800"/>
             </a:pPr>
             <a:r>
-              <a:rPr sz="3600"/>
+              <a:rPr sz="3600">
+                <a:latin typeface="Helvetica Light"/>
+                <a:ea typeface="Helvetica Light"/>
+                <a:cs typeface="Helvetica Light"/>
+                <a:sym typeface="Helvetica Light"/>
+              </a:rPr>
               <a:t>Kiran Dange</a:t>
             </a:r>
-            <a:endParaRPr sz="3600"/>
+            <a:endParaRPr>
+              <a:latin typeface="Helvetica Light"/>
+              <a:ea typeface="Helvetica Light"/>
+              <a:cs typeface="Helvetica Light"/>
+              <a:sym typeface="Helvetica Light"/>
+            </a:endParaRPr>
           </a:p>
           <a:p>
-            <a:pPr lvl="0" marL="360947" indent="-360947" algn="l">
+            <a:pPr lvl="0" marL="2887576" indent="-2887576" algn="l">
               <a:buSzPct val="100000"/>
+              <a:buFont typeface="Helvetica Light"/>
               <a:buChar char="•"/>
               <a:defRPr sz="1800"/>
             </a:pPr>
             <a:r>
-              <a:rPr sz="3600"/>
+              <a:rPr sz="3600">
+                <a:latin typeface="Helvetica Light"/>
+                <a:ea typeface="Helvetica Light"/>
+                <a:cs typeface="Helvetica Light"/>
+                <a:sym typeface="Helvetica Light"/>
+              </a:rPr>
               <a:t>Mohhamed Gadiwala</a:t>
             </a:r>
           </a:p>
@@ -9478,7 +9162,7 @@
           <a:bodyPr/>
           <a:lstStyle/>
           <a:p>
-            <a:pPr lvl="0" marL="834123" indent="-834123" algn="l">
+            <a:pPr lvl="0" marL="7848076" indent="-7848076" algn="l">
               <a:buSzPct val="75000"/>
               <a:buChar char="•"/>
               <a:defRPr sz="1800"/>
@@ -9490,7 +9174,7 @@
             <a:endParaRPr sz="3800"/>
           </a:p>
           <a:p>
-            <a:pPr lvl="0" marL="834123" indent="-834123" algn="l">
+            <a:pPr lvl="0" marL="7848076" indent="-7848076" algn="l">
               <a:buSzPct val="75000"/>
               <a:buChar char="•"/>
               <a:defRPr sz="1800"/>
@@ -9502,7 +9186,7 @@
             <a:endParaRPr sz="3800"/>
           </a:p>
           <a:p>
-            <a:pPr lvl="0" marL="834123" indent="-834123" algn="l">
+            <a:pPr lvl="0" marL="7848076" indent="-7848076" algn="l">
               <a:buSzPct val="75000"/>
               <a:buChar char="•"/>
               <a:defRPr sz="1800"/>
@@ -9550,8 +9234,8 @@
         </p:nvSpPr>
         <p:spPr>
           <a:xfrm>
-            <a:off x="1270000" y="1459158"/>
-            <a:ext cx="10464800" cy="6835284"/>
+            <a:off x="1270000" y="1459157"/>
+            <a:ext cx="10464800" cy="6835286"/>
           </a:xfrm>
           <a:prstGeom prst="rect">
             <a:avLst/>
@@ -9577,7 +9261,7 @@
             <a:endParaRPr sz="2900" u="sng"/>
           </a:p>
           <a:p>
-            <a:pPr lvl="0" marL="679151" indent="-679151" algn="l" defTabSz="531622">
+            <a:pPr lvl="0" marL="4577045" indent="-4577045" algn="l" defTabSz="531622">
               <a:buSzPct val="75000"/>
               <a:buChar char="•"/>
               <a:defRPr sz="1800"/>
@@ -9597,7 +9281,7 @@
             <a:endParaRPr sz="3400"/>
           </a:p>
           <a:p>
-            <a:pPr lvl="0" marL="679151" indent="-679151" algn="l" defTabSz="531622">
+            <a:pPr lvl="0" marL="4577045" indent="-4577045" algn="l" defTabSz="531622">
               <a:buSzPct val="75000"/>
               <a:buChar char="•"/>
               <a:defRPr sz="1800"/>
@@ -9617,7 +9301,7 @@
             <a:endParaRPr sz="3400"/>
           </a:p>
           <a:p>
-            <a:pPr lvl="0" marL="679151" indent="-679151" algn="l" defTabSz="531622">
+            <a:pPr lvl="0" marL="4577045" indent="-4577045" algn="l" defTabSz="531622">
               <a:buSzPct val="75000"/>
               <a:buChar char="•"/>
               <a:defRPr sz="1800"/>
@@ -9665,8 +9349,8 @@
         </p:nvSpPr>
         <p:spPr>
           <a:xfrm>
-            <a:off x="1270000" y="1459158"/>
-            <a:ext cx="10464800" cy="6835284"/>
+            <a:off x="1270000" y="1459157"/>
+            <a:ext cx="10464800" cy="6835286"/>
           </a:xfrm>
           <a:prstGeom prst="rect">
             <a:avLst/>
@@ -9692,7 +9376,7 @@
             <a:endParaRPr sz="3100" u="sng"/>
           </a:p>
           <a:p>
-            <a:pPr lvl="0" marL="804051" indent="-804051" algn="l" defTabSz="578358">
+            <a:pPr lvl="0" marL="6983465" indent="-6983465" algn="l" defTabSz="578358">
               <a:buSzPct val="75000"/>
               <a:buChar char="•"/>
               <a:defRPr sz="1800"/>
@@ -9712,7 +9396,7 @@
             <a:endParaRPr sz="3700"/>
           </a:p>
           <a:p>
-            <a:pPr lvl="0" marL="804051" indent="-804051" algn="l" defTabSz="578358">
+            <a:pPr lvl="0" marL="6983465" indent="-6983465" algn="l" defTabSz="578358">
               <a:buSzPct val="75000"/>
               <a:buChar char="•"/>
               <a:defRPr sz="1800"/>
@@ -9732,7 +9416,7 @@
             <a:endParaRPr sz="3700"/>
           </a:p>
           <a:p>
-            <a:pPr lvl="0" marL="804051" indent="-804051" algn="l" defTabSz="578358">
+            <a:pPr lvl="0" marL="6983465" indent="-6983465" algn="l" defTabSz="578358">
               <a:buSzPct val="75000"/>
               <a:buChar char="•"/>
               <a:defRPr sz="1800"/>
@@ -9791,69 +9475,69 @@
           <a:bodyPr/>
           <a:lstStyle/>
           <a:p>
-            <a:pPr lvl="0">
+            <a:pPr lvl="0" defTabSz="554990">
               <a:defRPr sz="1800"/>
             </a:pPr>
             <a:r>
-              <a:rPr sz="5000" u="sng"/>
+              <a:rPr sz="4750" u="sng"/>
               <a:t>Student/Teacher Level</a:t>
             </a:r>
-            <a:endParaRPr sz="5000" u="sng"/>
+            <a:endParaRPr sz="4750" u="sng"/>
           </a:p>
           <a:p>
-            <a:pPr lvl="0">
+            <a:pPr lvl="0" defTabSz="554990">
               <a:defRPr sz="1800"/>
             </a:pPr>
-            <a:endParaRPr u="sng"/>
+            <a:endParaRPr sz="1710" u="sng"/>
           </a:p>
           <a:p>
-            <a:pPr lvl="0" marL="834123" indent="-834123" algn="l">
+            <a:pPr lvl="0" marL="7455672" indent="-7455672" algn="l" defTabSz="554990">
               <a:buSzPct val="75000"/>
               <a:buChar char="•"/>
               <a:defRPr sz="1800"/>
             </a:pPr>
             <a:r>
-              <a:rPr sz="3800"/>
+              <a:rPr sz="3609"/>
               <a:t>View the components and technical specification of any computer.</a:t>
             </a:r>
-            <a:endParaRPr sz="3800"/>
+            <a:endParaRPr sz="3609"/>
           </a:p>
           <a:p>
-            <a:pPr lvl="0" marL="395111" indent="-395111" algn="l">
+            <a:pPr lvl="0" marL="375355" indent="-375355" algn="l" defTabSz="554990">
               <a:buSzPct val="75000"/>
               <a:buChar char="•"/>
               <a:defRPr sz="1800"/>
             </a:pPr>
-            <a:endParaRPr sz="3800"/>
+            <a:endParaRPr sz="3609"/>
           </a:p>
           <a:p>
-            <a:pPr lvl="0" marL="834123" indent="-834123" algn="l">
+            <a:pPr lvl="0" marL="7455672" indent="-7455672" algn="l" defTabSz="554990">
               <a:buSzPct val="75000"/>
               <a:buChar char="•"/>
               <a:defRPr sz="1800"/>
             </a:pPr>
             <a:r>
-              <a:rPr sz="3800"/>
+              <a:rPr sz="3609"/>
               <a:t>View the working status of any component.</a:t>
             </a:r>
-            <a:endParaRPr sz="3800"/>
+            <a:endParaRPr sz="3609"/>
           </a:p>
           <a:p>
-            <a:pPr lvl="0" marL="395111" indent="-395111" algn="l">
+            <a:pPr lvl="0" marL="375355" indent="-375355" algn="l" defTabSz="554990">
               <a:buSzPct val="75000"/>
               <a:buChar char="•"/>
               <a:defRPr sz="1800"/>
             </a:pPr>
-            <a:endParaRPr sz="3800"/>
+            <a:endParaRPr sz="3609"/>
           </a:p>
           <a:p>
-            <a:pPr lvl="0" marL="834123" indent="-834123" algn="l">
+            <a:pPr lvl="0" marL="7455672" indent="-7455672" algn="l" defTabSz="554990">
               <a:buSzPct val="75000"/>
               <a:buChar char="•"/>
               <a:defRPr sz="1800"/>
             </a:pPr>
             <a:r>
-              <a:rPr sz="3800"/>
+              <a:rPr sz="3609"/>
               <a:t>Lodge a complaint regarding faulty components and check the status of their lodged complaint.</a:t>
             </a:r>
           </a:p>
@@ -9895,8 +9579,8 @@
         </p:nvSpPr>
         <p:spPr>
           <a:xfrm>
-            <a:off x="384850" y="290002"/>
-            <a:ext cx="12235100" cy="1013175"/>
+            <a:off x="384848" y="290002"/>
+            <a:ext cx="12235103" cy="1013175"/>
           </a:xfrm>
           <a:prstGeom prst="rect">
             <a:avLst/>
@@ -9930,8 +9614,8 @@
         </p:nvSpPr>
         <p:spPr>
           <a:xfrm>
-            <a:off x="384850" y="1447238"/>
-            <a:ext cx="12235100" cy="7483204"/>
+            <a:off x="384848" y="1447238"/>
+            <a:ext cx="12235103" cy="7483203"/>
           </a:xfrm>
           <a:prstGeom prst="rect">
             <a:avLst/>
@@ -9941,7 +9625,7 @@
           <a:bodyPr/>
           <a:lstStyle/>
           <a:p>
-            <a:pPr lvl="0" marL="702419" indent="-702419" algn="l">
+            <a:pPr lvl="0" marL="3946647" indent="-3946647" algn="l">
               <a:buSzPct val="75000"/>
               <a:buChar char="•"/>
               <a:defRPr sz="1800"/>
@@ -9969,7 +9653,7 @@
             <a:endParaRPr sz="3200"/>
           </a:p>
           <a:p>
-            <a:pPr lvl="0" marL="702419" indent="-702419" algn="l">
+            <a:pPr lvl="0" marL="3946647" indent="-3946647" algn="l">
               <a:buSzPct val="75000"/>
               <a:buChar char="•"/>
               <a:defRPr sz="1800"/>
@@ -9984,7 +9668,7 @@
             </a:r>
             <a:r>
               <a:rPr sz="3200"/>
-              <a:t> Lab_ID)</a:t>
+              <a:t> Lab_ID, OS)</a:t>
             </a:r>
             <a:endParaRPr sz="3200"/>
           </a:p>
@@ -9997,7 +9681,7 @@
             <a:endParaRPr sz="3200"/>
           </a:p>
           <a:p>
-            <a:pPr lvl="0" marL="702419" indent="-702419" algn="l">
+            <a:pPr lvl="0" marL="3946647" indent="-3946647" algn="l">
               <a:buSzPct val="75000"/>
               <a:buChar char="•"/>
               <a:defRPr sz="1800"/>
@@ -10025,7 +9709,7 @@
             <a:endParaRPr sz="3200"/>
           </a:p>
           <a:p>
-            <a:pPr lvl="0" marL="702419" indent="-702419" algn="l">
+            <a:pPr lvl="0" marL="3946647" indent="-3946647" algn="l">
               <a:buSzPct val="75000"/>
               <a:buChar char="•"/>
               <a:defRPr sz="1800"/>
@@ -10053,7 +9737,7 @@
             <a:endParaRPr sz="3200"/>
           </a:p>
           <a:p>
-            <a:pPr lvl="0" marL="702419" indent="-702419" algn="l">
+            <a:pPr lvl="0" marL="3946647" indent="-3946647" algn="l">
               <a:buSzPct val="75000"/>
               <a:buChar char="•"/>
               <a:defRPr sz="1800"/>
@@ -10081,7 +9765,7 @@
             <a:endParaRPr sz="3200"/>
           </a:p>
           <a:p>
-            <a:pPr lvl="0" marL="702419" indent="-702419" algn="l">
+            <a:pPr lvl="0" marL="3946647" indent="-3946647" algn="l">
               <a:buSzPct val="75000"/>
               <a:buChar char="•"/>
               <a:defRPr sz="1800"/>
@@ -10188,8 +9872,8 @@
         </p:nvSpPr>
         <p:spPr>
           <a:xfrm>
-            <a:off x="5768086" y="698500"/>
-            <a:ext cx="1468629" cy="1320801"/>
+            <a:off x="5818885" y="749298"/>
+            <a:ext cx="1367029" cy="1219201"/>
           </a:xfrm>
           <a:prstGeom prst="rect">
             <a:avLst/>
@@ -10209,7 +9893,12 @@
           </a:bodyPr>
           <a:lstStyle>
             <a:lvl1pPr>
-              <a:defRPr sz="8000"/>
+              <a:defRPr sz="8000">
+                <a:latin typeface="Helvetica Light"/>
+                <a:ea typeface="Helvetica Light"/>
+                <a:cs typeface="Helvetica Light"/>
+                <a:sym typeface="Helvetica Light"/>
+              </a:defRPr>
             </a:lvl1pPr>
           </a:lstStyle>
           <a:p>
@@ -10225,7 +9914,7 @@
       </p:sp>
       <p:pic>
         <p:nvPicPr>
-          <p:cNvPr id="52" name="PCDA.jpg"/>
+          <p:cNvPr id="52" name="image1.jpeg"/>
           <p:cNvPicPr/>
           <p:nvPr/>
         </p:nvPicPr>
@@ -10239,8 +9928,8 @@
         </p:blipFill>
         <p:spPr>
           <a:xfrm>
-            <a:off x="-146050" y="2701166"/>
-            <a:ext cx="8963611" cy="4351268"/>
+            <a:off x="262085" y="2603500"/>
+            <a:ext cx="9525002" cy="4546600"/>
           </a:xfrm>
           <a:prstGeom prst="rect">
             <a:avLst/>
@@ -10513,10 +10202,10 @@
             </a:solidFill>
             <a:effectLst/>
             <a:uFillTx/>
-            <a:latin typeface="Helvetica Light"/>
-            <a:ea typeface="Helvetica Light"/>
-            <a:cs typeface="Helvetica Light"/>
-            <a:sym typeface="Helvetica Light"/>
+            <a:latin typeface="+mj-lt"/>
+            <a:ea typeface="+mj-ea"/>
+            <a:cs typeface="+mj-cs"/>
+            <a:sym typeface="Helvetica"/>
           </a:defRPr>
         </a:defPPr>
         <a:lvl1pPr marL="0" marR="0" indent="0" algn="l" defTabSz="914400" rtl="0" fontAlgn="auto" latinLnBrk="1" hangingPunct="0">
@@ -11088,10 +10777,10 @@
             </a:solidFill>
             <a:effectLst/>
             <a:uFillTx/>
-            <a:latin typeface="Helvetica Light"/>
-            <a:ea typeface="Helvetica Light"/>
-            <a:cs typeface="Helvetica Light"/>
-            <a:sym typeface="Helvetica Light"/>
+            <a:latin typeface="+mj-lt"/>
+            <a:ea typeface="+mj-ea"/>
+            <a:cs typeface="+mj-cs"/>
+            <a:sym typeface="Helvetica"/>
           </a:defRPr>
         </a:defPPr>
         <a:lvl1pPr marL="0" marR="0" indent="0" algn="l" defTabSz="914400" rtl="0" fontAlgn="auto" latinLnBrk="1" hangingPunct="0">
@@ -11594,10 +11283,10 @@
             </a:solidFill>
             <a:effectLst/>
             <a:uFillTx/>
-            <a:latin typeface="Helvetica Light"/>
-            <a:ea typeface="Helvetica Light"/>
-            <a:cs typeface="Helvetica Light"/>
-            <a:sym typeface="Helvetica Light"/>
+            <a:latin typeface="+mj-lt"/>
+            <a:ea typeface="+mj-ea"/>
+            <a:cs typeface="+mj-cs"/>
+            <a:sym typeface="Helvetica"/>
           </a:defRPr>
         </a:defPPr>
         <a:lvl1pPr marL="0" marR="0" indent="0" algn="l" defTabSz="914400" rtl="0" fontAlgn="auto" latinLnBrk="1" hangingPunct="0">
@@ -12169,10 +11858,10 @@
             </a:solidFill>
             <a:effectLst/>
             <a:uFillTx/>
-            <a:latin typeface="Helvetica Light"/>
-            <a:ea typeface="Helvetica Light"/>
-            <a:cs typeface="Helvetica Light"/>
-            <a:sym typeface="Helvetica Light"/>
+            <a:latin typeface="+mj-lt"/>
+            <a:ea typeface="+mj-ea"/>
+            <a:cs typeface="+mj-cs"/>
+            <a:sym typeface="Helvetica"/>
           </a:defRPr>
         </a:defPPr>
         <a:lvl1pPr marL="0" marR="0" indent="0" algn="l" defTabSz="914400" rtl="0" fontAlgn="auto" latinLnBrk="1" hangingPunct="0">

</xml_diff>